<commit_message>
Update Western Power Hack-a-Gig Presentation.pptx
</commit_message>
<xml_diff>
--- a/Western Power Hack-a-Gig Presentation.pptx
+++ b/Western Power Hack-a-Gig Presentation.pptx
@@ -5,10 +5,10 @@
     <p:sldMasterId id="2147483660" r:id="rId4"/>
   </p:sldMasterIdLst>
   <p:notesMasterIdLst>
-    <p:notesMasterId r:id="rId31"/>
+    <p:notesMasterId r:id="rId30"/>
   </p:notesMasterIdLst>
   <p:handoutMasterIdLst>
-    <p:handoutMasterId r:id="rId32"/>
+    <p:handoutMasterId r:id="rId31"/>
   </p:handoutMasterIdLst>
   <p:sldIdLst>
     <p:sldId id="257" r:id="rId5"/>
@@ -19,24 +19,23 @@
     <p:sldId id="287" r:id="rId10"/>
     <p:sldId id="288" r:id="rId11"/>
     <p:sldId id="289" r:id="rId12"/>
-    <p:sldId id="269" r:id="rId13"/>
-    <p:sldId id="259" r:id="rId14"/>
-    <p:sldId id="262" r:id="rId15"/>
-    <p:sldId id="263" r:id="rId16"/>
-    <p:sldId id="270" r:id="rId17"/>
-    <p:sldId id="271" r:id="rId18"/>
-    <p:sldId id="272" r:id="rId19"/>
-    <p:sldId id="273" r:id="rId20"/>
-    <p:sldId id="274" r:id="rId21"/>
-    <p:sldId id="275" r:id="rId22"/>
-    <p:sldId id="276" r:id="rId23"/>
-    <p:sldId id="282" r:id="rId24"/>
-    <p:sldId id="278" r:id="rId25"/>
-    <p:sldId id="286" r:id="rId26"/>
-    <p:sldId id="283" r:id="rId27"/>
-    <p:sldId id="279" r:id="rId28"/>
-    <p:sldId id="280" r:id="rId29"/>
-    <p:sldId id="281" r:id="rId30"/>
+    <p:sldId id="259" r:id="rId13"/>
+    <p:sldId id="262" r:id="rId14"/>
+    <p:sldId id="263" r:id="rId15"/>
+    <p:sldId id="270" r:id="rId16"/>
+    <p:sldId id="271" r:id="rId17"/>
+    <p:sldId id="272" r:id="rId18"/>
+    <p:sldId id="273" r:id="rId19"/>
+    <p:sldId id="274" r:id="rId20"/>
+    <p:sldId id="275" r:id="rId21"/>
+    <p:sldId id="276" r:id="rId22"/>
+    <p:sldId id="282" r:id="rId23"/>
+    <p:sldId id="278" r:id="rId24"/>
+    <p:sldId id="286" r:id="rId25"/>
+    <p:sldId id="283" r:id="rId26"/>
+    <p:sldId id="279" r:id="rId27"/>
+    <p:sldId id="280" r:id="rId28"/>
+    <p:sldId id="281" r:id="rId29"/>
   </p:sldIdLst>
   <p:sldSz cx="12188825" cy="6858000"/>
   <p:notesSz cx="6858000" cy="9144000"/>
@@ -3965,7 +3964,7 @@
           <a:p>
             <a:fld id="{FE5B4EDC-59C0-49C7-8ADA-5A781B329E02}" type="datetimeFigureOut">
               <a:rPr lang="en-US"/>
-              <a:t>11/1/2018</a:t>
+              <a:t>11/2/2018</a:t>
             </a:fld>
             <a:endParaRPr/>
           </a:p>
@@ -4130,7 +4129,7 @@
           <a:p>
             <a:fld id="{F2D8D46A-B586-417D-BFBD-8C8FE0AAF762}" type="datetimeFigureOut">
               <a:rPr lang="en-US"/>
-              <a:t>11/1/2018</a:t>
+              <a:t>11/2/2018</a:t>
             </a:fld>
             <a:endParaRPr/>
           </a:p>
@@ -5692,7 +5691,7 @@
           <a:p>
             <a:fld id="{F0DFD029-FB74-4578-B929-F66AA97659CA}" type="datetimeFigureOut">
               <a:rPr lang="en-US"/>
-              <a:t>11/1/2018</a:t>
+              <a:t>11/2/2018</a:t>
             </a:fld>
             <a:endParaRPr/>
           </a:p>
@@ -5890,7 +5889,7 @@
           <a:p>
             <a:fld id="{F0DFD029-FB74-4578-B929-F66AA97659CA}" type="datetimeFigureOut">
               <a:rPr lang="en-US"/>
-              <a:t>11/1/2018</a:t>
+              <a:t>11/2/2018</a:t>
             </a:fld>
             <a:endParaRPr/>
           </a:p>
@@ -6098,7 +6097,7 @@
           <a:p>
             <a:fld id="{F0DFD029-FB74-4578-B929-F66AA97659CA}" type="datetimeFigureOut">
               <a:rPr lang="en-US"/>
-              <a:t>11/1/2018</a:t>
+              <a:t>11/2/2018</a:t>
             </a:fld>
             <a:endParaRPr/>
           </a:p>
@@ -6296,7 +6295,7 @@
           <a:p>
             <a:fld id="{F0DFD029-FB74-4578-B929-F66AA97659CA}" type="datetimeFigureOut">
               <a:rPr lang="en-US"/>
-              <a:t>11/1/2018</a:t>
+              <a:t>11/2/2018</a:t>
             </a:fld>
             <a:endParaRPr/>
           </a:p>
@@ -6728,7 +6727,7 @@
           <a:p>
             <a:fld id="{F0DFD029-FB74-4578-B929-F66AA97659CA}" type="datetimeFigureOut">
               <a:rPr lang="en-US"/>
-              <a:t>11/1/2018</a:t>
+              <a:t>11/2/2018</a:t>
             </a:fld>
             <a:endParaRPr/>
           </a:p>
@@ -7032,7 +7031,7 @@
           <a:p>
             <a:fld id="{F0DFD029-FB74-4578-B929-F66AA97659CA}" type="datetimeFigureOut">
               <a:rPr lang="en-US"/>
-              <a:t>11/1/2018</a:t>
+              <a:t>11/2/2018</a:t>
             </a:fld>
             <a:endParaRPr/>
           </a:p>
@@ -7488,7 +7487,7 @@
           <a:p>
             <a:fld id="{F0DFD029-FB74-4578-B929-F66AA97659CA}" type="datetimeFigureOut">
               <a:rPr lang="en-US"/>
-              <a:t>11/1/2018</a:t>
+              <a:t>11/2/2018</a:t>
             </a:fld>
             <a:endParaRPr/>
           </a:p>
@@ -7618,7 +7617,7 @@
           <a:p>
             <a:fld id="{F0DFD029-FB74-4578-B929-F66AA97659CA}" type="datetimeFigureOut">
               <a:rPr lang="en-US"/>
-              <a:t>11/1/2018</a:t>
+              <a:t>11/2/2018</a:t>
             </a:fld>
             <a:endParaRPr/>
           </a:p>
@@ -7725,7 +7724,7 @@
           <a:p>
             <a:fld id="{F0DFD029-FB74-4578-B929-F66AA97659CA}" type="datetimeFigureOut">
               <a:rPr lang="en-US"/>
-              <a:t>11/1/2018</a:t>
+              <a:t>11/2/2018</a:t>
             </a:fld>
             <a:endParaRPr/>
           </a:p>
@@ -8024,7 +8023,7 @@
           <a:p>
             <a:fld id="{F0DFD029-FB74-4578-B929-F66AA97659CA}" type="datetimeFigureOut">
               <a:rPr lang="en-US"/>
-              <a:t>11/1/2018</a:t>
+              <a:t>11/2/2018</a:t>
             </a:fld>
             <a:endParaRPr/>
           </a:p>
@@ -8312,7 +8311,7 @@
           <a:p>
             <a:fld id="{F0DFD029-FB74-4578-B929-F66AA97659CA}" type="datetimeFigureOut">
               <a:rPr lang="en-US"/>
-              <a:t>11/1/2018</a:t>
+              <a:t>11/2/2018</a:t>
             </a:fld>
             <a:endParaRPr/>
           </a:p>
@@ -8935,7 +8934,7 @@
             <a:fld id="{F0DFD029-FB74-4578-B929-F66AA97659CA}" type="datetimeFigureOut">
               <a:rPr lang="en-US"/>
               <a:pPr/>
-              <a:t>11/1/2018</a:t>
+              <a:t>11/2/2018</a:t>
             </a:fld>
             <a:endParaRPr/>
           </a:p>
@@ -9469,7 +9468,7 @@
           <p:cNvPr id="6" name="Rectangle 5">
             <a:extLst>
               <a:ext uri="{FF2B5EF4-FFF2-40B4-BE49-F238E27FC236}">
-                <a16:creationId xmlns:a16="http://schemas.microsoft.com/office/drawing/2014/main" xmlns="" id="{B00556E9-6BE7-4FBC-BF96-86696EEE03F8}"/>
+                <a16:creationId xmlns="" xmlns:a16="http://schemas.microsoft.com/office/drawing/2014/main" id="{B00556E9-6BE7-4FBC-BF96-86696EEE03F8}"/>
               </a:ext>
             </a:extLst>
           </p:cNvPr>
@@ -9515,7 +9514,7 @@
           <p:cNvPr id="8" name="Picture 7">
             <a:extLst>
               <a:ext uri="{FF2B5EF4-FFF2-40B4-BE49-F238E27FC236}">
-                <a16:creationId xmlns:a16="http://schemas.microsoft.com/office/drawing/2014/main" xmlns="" id="{844222BE-707C-453A-A140-8569DFCD4664}"/>
+                <a16:creationId xmlns="" xmlns:a16="http://schemas.microsoft.com/office/drawing/2014/main" id="{844222BE-707C-453A-A140-8569DFCD4664}"/>
               </a:ext>
             </a:extLst>
           </p:cNvPr>
@@ -9551,7 +9550,7 @@
           <p:cNvPr id="4" name="Picture 3">
             <a:extLst>
               <a:ext uri="{FF2B5EF4-FFF2-40B4-BE49-F238E27FC236}">
-                <a16:creationId xmlns:a16="http://schemas.microsoft.com/office/drawing/2014/main" xmlns="" id="{61C71974-9754-43FD-8E8E-35E616625CF2}"/>
+                <a16:creationId xmlns="" xmlns:a16="http://schemas.microsoft.com/office/drawing/2014/main" id="{61C71974-9754-43FD-8E8E-35E616625CF2}"/>
               </a:ext>
             </a:extLst>
           </p:cNvPr>
@@ -9626,103 +9625,6 @@
       </p:grpSpPr>
       <p:sp>
         <p:nvSpPr>
-          <p:cNvPr id="4" name="Title 3"/>
-          <p:cNvSpPr>
-            <a:spLocks noGrp="1"/>
-          </p:cNvSpPr>
-          <p:nvPr>
-            <p:ph type="title"/>
-          </p:nvPr>
-        </p:nvSpPr>
-        <p:spPr/>
-        <p:txBody>
-          <a:bodyPr/>
-          <a:lstStyle/>
-          <a:p>
-            <a:r>
-              <a:rPr lang="en-US" dirty="0"/>
-              <a:t>Challenge 2</a:t>
-            </a:r>
-          </a:p>
-        </p:txBody>
-      </p:sp>
-      <p:sp>
-        <p:nvSpPr>
-          <p:cNvPr id="5" name="Text Placeholder 4"/>
-          <p:cNvSpPr>
-            <a:spLocks noGrp="1"/>
-          </p:cNvSpPr>
-          <p:nvPr>
-            <p:ph type="body" idx="1"/>
-          </p:nvPr>
-        </p:nvSpPr>
-        <p:spPr/>
-        <p:txBody>
-          <a:bodyPr>
-            <a:normAutofit lnSpcReduction="10000"/>
-          </a:bodyPr>
-          <a:lstStyle/>
-          <a:p>
-            <a:r>
-              <a:rPr lang="en-US" dirty="0"/>
-              <a:t>Photovoltaic generation</a:t>
-            </a:r>
-          </a:p>
-          <a:p>
-            <a:endParaRPr lang="en-US" dirty="0"/>
-          </a:p>
-          <a:p>
-            <a:r>
-              <a:rPr lang="en-US" dirty="0"/>
-              <a:t>PART A - Detection</a:t>
-            </a:r>
-          </a:p>
-        </p:txBody>
-      </p:sp>
-    </p:spTree>
-    <p:extLst>
-      <p:ext uri="{BB962C8B-B14F-4D97-AF65-F5344CB8AC3E}">
-        <p14:creationId xmlns:p14="http://schemas.microsoft.com/office/powerpoint/2010/main" val="4264977537"/>
-      </p:ext>
-    </p:extLst>
-  </p:cSld>
-  <p:clrMapOvr>
-    <a:masterClrMapping/>
-  </p:clrMapOvr>
-  <mc:AlternateContent xmlns:mc="http://schemas.openxmlformats.org/markup-compatibility/2006" xmlns:p14="http://schemas.microsoft.com/office/powerpoint/2010/main">
-    <mc:Choice Requires="p14">
-      <p:transition spd="med" p14:dur="700">
-        <p:fade/>
-      </p:transition>
-    </mc:Choice>
-    <mc:Fallback xmlns="">
-      <p:transition spd="med">
-        <p:fade/>
-      </p:transition>
-    </mc:Fallback>
-  </mc:AlternateContent>
-</p:sld>
-</file>
-
-<file path=ppt/slides/slide11.xml><?xml version="1.0" encoding="utf-8"?>
-<p:sld xmlns:a="http://schemas.openxmlformats.org/drawingml/2006/main" xmlns:r="http://schemas.openxmlformats.org/officeDocument/2006/relationships" xmlns:p="http://schemas.openxmlformats.org/presentationml/2006/main">
-  <p:cSld>
-    <p:spTree>
-      <p:nvGrpSpPr>
-        <p:cNvPr id="1" name=""/>
-        <p:cNvGrpSpPr/>
-        <p:nvPr/>
-      </p:nvGrpSpPr>
-      <p:grpSpPr>
-        <a:xfrm>
-          <a:off x="0" y="0"/>
-          <a:ext cx="0" cy="0"/>
-          <a:chOff x="0" y="0"/>
-          <a:chExt cx="0" cy="0"/>
-        </a:xfrm>
-      </p:grpSpPr>
-      <p:sp>
-        <p:nvSpPr>
           <p:cNvPr id="3" name="Title 2"/>
           <p:cNvSpPr>
             <a:spLocks noGrp="1"/>
@@ -9748,7 +9650,7 @@
           <p:cNvPr id="2" name="Content Placeholder 1">
             <a:extLst>
               <a:ext uri="{FF2B5EF4-FFF2-40B4-BE49-F238E27FC236}">
-                <a16:creationId xmlns:a16="http://schemas.microsoft.com/office/drawing/2014/main" xmlns="" id="{51569DDC-B169-4DBF-AE32-3C50C98FCCD9}"/>
+                <a16:creationId xmlns="" xmlns:a16="http://schemas.microsoft.com/office/drawing/2014/main" id="{51569DDC-B169-4DBF-AE32-3C50C98FCCD9}"/>
               </a:ext>
             </a:extLst>
           </p:cNvPr>
@@ -9842,7 +9744,7 @@
           <p:cNvPr id="4" name="Diagram 3">
             <a:extLst>
               <a:ext uri="{FF2B5EF4-FFF2-40B4-BE49-F238E27FC236}">
-                <a16:creationId xmlns:a16="http://schemas.microsoft.com/office/drawing/2014/main" xmlns="" id="{8E92447E-19E6-4162-923D-17AED9E3BCF5}"/>
+                <a16:creationId xmlns="" xmlns:a16="http://schemas.microsoft.com/office/drawing/2014/main" id="{8E92447E-19E6-4162-923D-17AED9E3BCF5}"/>
               </a:ext>
             </a:extLst>
           </p:cNvPr>
@@ -9890,7 +9792,7 @@
 </p:sld>
 </file>
 
-<file path=ppt/slides/slide12.xml><?xml version="1.0" encoding="utf-8"?>
+<file path=ppt/slides/slide11.xml><?xml version="1.0" encoding="utf-8"?>
 <p:sld xmlns:a="http://schemas.openxmlformats.org/drawingml/2006/main" xmlns:r="http://schemas.openxmlformats.org/officeDocument/2006/relationships" xmlns:p="http://schemas.openxmlformats.org/presentationml/2006/main">
   <p:cSld>
     <p:spTree>
@@ -9912,7 +9814,7 @@
           <p:cNvPr id="2" name="Title 1">
             <a:extLst>
               <a:ext uri="{FF2B5EF4-FFF2-40B4-BE49-F238E27FC236}">
-                <a16:creationId xmlns:a16="http://schemas.microsoft.com/office/drawing/2014/main" xmlns="" id="{118CBBA9-49D2-4262-9114-D0D47E7D522A}"/>
+                <a16:creationId xmlns="" xmlns:a16="http://schemas.microsoft.com/office/drawing/2014/main" id="{118CBBA9-49D2-4262-9114-D0D47E7D522A}"/>
               </a:ext>
             </a:extLst>
           </p:cNvPr>
@@ -9940,7 +9842,7 @@
           <p:cNvPr id="3" name="Content Placeholder 2">
             <a:extLst>
               <a:ext uri="{FF2B5EF4-FFF2-40B4-BE49-F238E27FC236}">
-                <a16:creationId xmlns:a16="http://schemas.microsoft.com/office/drawing/2014/main" xmlns="" id="{1E6F3B36-FA1C-4A44-8799-54720A510D55}"/>
+                <a16:creationId xmlns="" xmlns:a16="http://schemas.microsoft.com/office/drawing/2014/main" id="{1E6F3B36-FA1C-4A44-8799-54720A510D55}"/>
               </a:ext>
             </a:extLst>
           </p:cNvPr>
@@ -10024,7 +9926,7 @@
 </p:sld>
 </file>
 
-<file path=ppt/slides/slide13.xml><?xml version="1.0" encoding="utf-8"?>
+<file path=ppt/slides/slide12.xml><?xml version="1.0" encoding="utf-8"?>
 <p:sld xmlns:a="http://schemas.openxmlformats.org/drawingml/2006/main" xmlns:r="http://schemas.openxmlformats.org/officeDocument/2006/relationships" xmlns:p="http://schemas.openxmlformats.org/presentationml/2006/main">
   <p:cSld>
     <p:spTree>
@@ -10046,7 +9948,7 @@
           <p:cNvPr id="2" name="Title 1">
             <a:extLst>
               <a:ext uri="{FF2B5EF4-FFF2-40B4-BE49-F238E27FC236}">
-                <a16:creationId xmlns:a16="http://schemas.microsoft.com/office/drawing/2014/main" xmlns="" id="{118CBBA9-49D2-4262-9114-D0D47E7D522A}"/>
+                <a16:creationId xmlns="" xmlns:a16="http://schemas.microsoft.com/office/drawing/2014/main" id="{118CBBA9-49D2-4262-9114-D0D47E7D522A}"/>
               </a:ext>
             </a:extLst>
           </p:cNvPr>
@@ -10074,7 +9976,7 @@
           <p:cNvPr id="3" name="Content Placeholder 2">
             <a:extLst>
               <a:ext uri="{FF2B5EF4-FFF2-40B4-BE49-F238E27FC236}">
-                <a16:creationId xmlns:a16="http://schemas.microsoft.com/office/drawing/2014/main" xmlns="" id="{1E6F3B36-FA1C-4A44-8799-54720A510D55}"/>
+                <a16:creationId xmlns="" xmlns:a16="http://schemas.microsoft.com/office/drawing/2014/main" id="{1E6F3B36-FA1C-4A44-8799-54720A510D55}"/>
               </a:ext>
             </a:extLst>
           </p:cNvPr>
@@ -10114,7 +10016,7 @@
           <p:cNvPr id="4" name="Picture 3">
             <a:extLst>
               <a:ext uri="{FF2B5EF4-FFF2-40B4-BE49-F238E27FC236}">
-                <a16:creationId xmlns:a16="http://schemas.microsoft.com/office/drawing/2014/main" xmlns="" id="{60407E82-ED49-48E1-845F-A67334BDA690}"/>
+                <a16:creationId xmlns="" xmlns:a16="http://schemas.microsoft.com/office/drawing/2014/main" id="{60407E82-ED49-48E1-845F-A67334BDA690}"/>
               </a:ext>
             </a:extLst>
           </p:cNvPr>
@@ -10144,7 +10046,7 @@
           <p:cNvPr id="5" name="Content Placeholder 2">
             <a:extLst>
               <a:ext uri="{FF2B5EF4-FFF2-40B4-BE49-F238E27FC236}">
-                <a16:creationId xmlns:a16="http://schemas.microsoft.com/office/drawing/2014/main" xmlns="" id="{8CE8AF33-D730-4EBA-9FBD-DBA3E37E84FC}"/>
+                <a16:creationId xmlns="" xmlns:a16="http://schemas.microsoft.com/office/drawing/2014/main" id="{8CE8AF33-D730-4EBA-9FBD-DBA3E37E84FC}"/>
               </a:ext>
             </a:extLst>
           </p:cNvPr>
@@ -10437,7 +10339,7 @@
 </p:sld>
 </file>
 
-<file path=ppt/slides/slide14.xml><?xml version="1.0" encoding="utf-8"?>
+<file path=ppt/slides/slide13.xml><?xml version="1.0" encoding="utf-8"?>
 <p:sld xmlns:a="http://schemas.openxmlformats.org/drawingml/2006/main" xmlns:r="http://schemas.openxmlformats.org/officeDocument/2006/relationships" xmlns:p="http://schemas.openxmlformats.org/presentationml/2006/main">
   <p:cSld>
     <p:spTree>
@@ -10459,7 +10361,7 @@
           <p:cNvPr id="2" name="Title 1">
             <a:extLst>
               <a:ext uri="{FF2B5EF4-FFF2-40B4-BE49-F238E27FC236}">
-                <a16:creationId xmlns:a16="http://schemas.microsoft.com/office/drawing/2014/main" xmlns="" id="{118CBBA9-49D2-4262-9114-D0D47E7D522A}"/>
+                <a16:creationId xmlns="" xmlns:a16="http://schemas.microsoft.com/office/drawing/2014/main" id="{118CBBA9-49D2-4262-9114-D0D47E7D522A}"/>
               </a:ext>
             </a:extLst>
           </p:cNvPr>
@@ -10487,7 +10389,7 @@
           <p:cNvPr id="3" name="Content Placeholder 2">
             <a:extLst>
               <a:ext uri="{FF2B5EF4-FFF2-40B4-BE49-F238E27FC236}">
-                <a16:creationId xmlns:a16="http://schemas.microsoft.com/office/drawing/2014/main" xmlns="" id="{1E6F3B36-FA1C-4A44-8799-54720A510D55}"/>
+                <a16:creationId xmlns="" xmlns:a16="http://schemas.microsoft.com/office/drawing/2014/main" id="{1E6F3B36-FA1C-4A44-8799-54720A510D55}"/>
               </a:ext>
             </a:extLst>
           </p:cNvPr>
@@ -10527,7 +10429,7 @@
           <p:cNvPr id="6" name="Picture 5">
             <a:extLst>
               <a:ext uri="{FF2B5EF4-FFF2-40B4-BE49-F238E27FC236}">
-                <a16:creationId xmlns:a16="http://schemas.microsoft.com/office/drawing/2014/main" xmlns="" id="{B0636FC0-8732-43F6-B07E-D247F6761BF2}"/>
+                <a16:creationId xmlns="" xmlns:a16="http://schemas.microsoft.com/office/drawing/2014/main" id="{B0636FC0-8732-43F6-B07E-D247F6761BF2}"/>
               </a:ext>
             </a:extLst>
           </p:cNvPr>
@@ -10557,7 +10459,7 @@
           <p:cNvPr id="7" name="Picture 6">
             <a:extLst>
               <a:ext uri="{FF2B5EF4-FFF2-40B4-BE49-F238E27FC236}">
-                <a16:creationId xmlns:a16="http://schemas.microsoft.com/office/drawing/2014/main" xmlns="" id="{DBE739BC-7545-4A28-A2A1-83C40AA0F973}"/>
+                <a16:creationId xmlns="" xmlns:a16="http://schemas.microsoft.com/office/drawing/2014/main" id="{DBE739BC-7545-4A28-A2A1-83C40AA0F973}"/>
               </a:ext>
             </a:extLst>
           </p:cNvPr>
@@ -10587,7 +10489,7 @@
           <p:cNvPr id="9" name="Content Placeholder 2">
             <a:extLst>
               <a:ext uri="{FF2B5EF4-FFF2-40B4-BE49-F238E27FC236}">
-                <a16:creationId xmlns:a16="http://schemas.microsoft.com/office/drawing/2014/main" xmlns="" id="{55F4540C-A796-46DC-BFE3-B3DABF5ED521}"/>
+                <a16:creationId xmlns="" xmlns:a16="http://schemas.microsoft.com/office/drawing/2014/main" id="{55F4540C-A796-46DC-BFE3-B3DABF5ED521}"/>
               </a:ext>
             </a:extLst>
           </p:cNvPr>
@@ -10854,7 +10756,7 @@
 </p:sld>
 </file>
 
-<file path=ppt/slides/slide15.xml><?xml version="1.0" encoding="utf-8"?>
+<file path=ppt/slides/slide14.xml><?xml version="1.0" encoding="utf-8"?>
 <p:sld xmlns:a="http://schemas.openxmlformats.org/drawingml/2006/main" xmlns:r="http://schemas.openxmlformats.org/officeDocument/2006/relationships" xmlns:p="http://schemas.openxmlformats.org/presentationml/2006/main">
   <p:cSld>
     <p:spTree>
@@ -10876,7 +10778,7 @@
           <p:cNvPr id="2" name="Title 1">
             <a:extLst>
               <a:ext uri="{FF2B5EF4-FFF2-40B4-BE49-F238E27FC236}">
-                <a16:creationId xmlns:a16="http://schemas.microsoft.com/office/drawing/2014/main" xmlns="" id="{118CBBA9-49D2-4262-9114-D0D47E7D522A}"/>
+                <a16:creationId xmlns="" xmlns:a16="http://schemas.microsoft.com/office/drawing/2014/main" id="{118CBBA9-49D2-4262-9114-D0D47E7D522A}"/>
               </a:ext>
             </a:extLst>
           </p:cNvPr>
@@ -10904,7 +10806,7 @@
           <p:cNvPr id="3" name="Content Placeholder 2">
             <a:extLst>
               <a:ext uri="{FF2B5EF4-FFF2-40B4-BE49-F238E27FC236}">
-                <a16:creationId xmlns:a16="http://schemas.microsoft.com/office/drawing/2014/main" xmlns="" id="{1E6F3B36-FA1C-4A44-8799-54720A510D55}"/>
+                <a16:creationId xmlns="" xmlns:a16="http://schemas.microsoft.com/office/drawing/2014/main" id="{1E6F3B36-FA1C-4A44-8799-54720A510D55}"/>
               </a:ext>
             </a:extLst>
           </p:cNvPr>
@@ -10944,7 +10846,7 @@
           <p:cNvPr id="9" name="Content Placeholder 2">
             <a:extLst>
               <a:ext uri="{FF2B5EF4-FFF2-40B4-BE49-F238E27FC236}">
-                <a16:creationId xmlns:a16="http://schemas.microsoft.com/office/drawing/2014/main" xmlns="" id="{55F4540C-A796-46DC-BFE3-B3DABF5ED521}"/>
+                <a16:creationId xmlns="" xmlns:a16="http://schemas.microsoft.com/office/drawing/2014/main" id="{55F4540C-A796-46DC-BFE3-B3DABF5ED521}"/>
               </a:ext>
             </a:extLst>
           </p:cNvPr>
@@ -11229,7 +11131,7 @@
           <p:cNvPr id="5" name="Picture 4">
             <a:extLst>
               <a:ext uri="{FF2B5EF4-FFF2-40B4-BE49-F238E27FC236}">
-                <a16:creationId xmlns:a16="http://schemas.microsoft.com/office/drawing/2014/main" xmlns="" id="{8CE529A0-F393-4416-8C0C-29777CE93EFE}"/>
+                <a16:creationId xmlns="" xmlns:a16="http://schemas.microsoft.com/office/drawing/2014/main" id="{8CE529A0-F393-4416-8C0C-29777CE93EFE}"/>
               </a:ext>
             </a:extLst>
           </p:cNvPr>
@@ -11259,7 +11161,7 @@
           <p:cNvPr id="8" name="Picture 7">
             <a:extLst>
               <a:ext uri="{FF2B5EF4-FFF2-40B4-BE49-F238E27FC236}">
-                <a16:creationId xmlns:a16="http://schemas.microsoft.com/office/drawing/2014/main" xmlns="" id="{0FBC03D0-87FA-4CDE-8704-5071F2C850AC}"/>
+                <a16:creationId xmlns="" xmlns:a16="http://schemas.microsoft.com/office/drawing/2014/main" id="{0FBC03D0-87FA-4CDE-8704-5071F2C850AC}"/>
               </a:ext>
             </a:extLst>
           </p:cNvPr>
@@ -11309,7 +11211,7 @@
 </p:sld>
 </file>
 
-<file path=ppt/slides/slide16.xml><?xml version="1.0" encoding="utf-8"?>
+<file path=ppt/slides/slide15.xml><?xml version="1.0" encoding="utf-8"?>
 <p:sld xmlns:a="http://schemas.openxmlformats.org/drawingml/2006/main" xmlns:r="http://schemas.openxmlformats.org/officeDocument/2006/relationships" xmlns:p="http://schemas.openxmlformats.org/presentationml/2006/main">
   <p:cSld>
     <p:spTree>
@@ -11331,7 +11233,7 @@
           <p:cNvPr id="2" name="Title 1">
             <a:extLst>
               <a:ext uri="{FF2B5EF4-FFF2-40B4-BE49-F238E27FC236}">
-                <a16:creationId xmlns:a16="http://schemas.microsoft.com/office/drawing/2014/main" xmlns="" id="{118CBBA9-49D2-4262-9114-D0D47E7D522A}"/>
+                <a16:creationId xmlns="" xmlns:a16="http://schemas.microsoft.com/office/drawing/2014/main" id="{118CBBA9-49D2-4262-9114-D0D47E7D522A}"/>
               </a:ext>
             </a:extLst>
           </p:cNvPr>
@@ -11359,7 +11261,7 @@
           <p:cNvPr id="3" name="Content Placeholder 2">
             <a:extLst>
               <a:ext uri="{FF2B5EF4-FFF2-40B4-BE49-F238E27FC236}">
-                <a16:creationId xmlns:a16="http://schemas.microsoft.com/office/drawing/2014/main" xmlns="" id="{1E6F3B36-FA1C-4A44-8799-54720A510D55}"/>
+                <a16:creationId xmlns="" xmlns:a16="http://schemas.microsoft.com/office/drawing/2014/main" id="{1E6F3B36-FA1C-4A44-8799-54720A510D55}"/>
               </a:ext>
             </a:extLst>
           </p:cNvPr>
@@ -11399,7 +11301,7 @@
           <p:cNvPr id="9" name="Content Placeholder 2">
             <a:extLst>
               <a:ext uri="{FF2B5EF4-FFF2-40B4-BE49-F238E27FC236}">
-                <a16:creationId xmlns:a16="http://schemas.microsoft.com/office/drawing/2014/main" xmlns="" id="{55F4540C-A796-46DC-BFE3-B3DABF5ED521}"/>
+                <a16:creationId xmlns="" xmlns:a16="http://schemas.microsoft.com/office/drawing/2014/main" id="{55F4540C-A796-46DC-BFE3-B3DABF5ED521}"/>
               </a:ext>
             </a:extLst>
           </p:cNvPr>
@@ -11656,7 +11558,7 @@
           <p:cNvPr id="4" name="Picture 3">
             <a:extLst>
               <a:ext uri="{FF2B5EF4-FFF2-40B4-BE49-F238E27FC236}">
-                <a16:creationId xmlns:a16="http://schemas.microsoft.com/office/drawing/2014/main" xmlns="" id="{372C644D-8F63-4F1D-8890-93FE0818D320}"/>
+                <a16:creationId xmlns="" xmlns:a16="http://schemas.microsoft.com/office/drawing/2014/main" id="{372C644D-8F63-4F1D-8890-93FE0818D320}"/>
               </a:ext>
             </a:extLst>
           </p:cNvPr>
@@ -11686,7 +11588,7 @@
           <p:cNvPr id="5" name="Picture 4">
             <a:extLst>
               <a:ext uri="{FF2B5EF4-FFF2-40B4-BE49-F238E27FC236}">
-                <a16:creationId xmlns:a16="http://schemas.microsoft.com/office/drawing/2014/main" xmlns="" id="{C9CBC7BF-F2B4-4B1F-B9F0-E060D6AAC33B}"/>
+                <a16:creationId xmlns="" xmlns:a16="http://schemas.microsoft.com/office/drawing/2014/main" id="{C9CBC7BF-F2B4-4B1F-B9F0-E060D6AAC33B}"/>
               </a:ext>
             </a:extLst>
           </p:cNvPr>
@@ -11736,7 +11638,7 @@
 </p:sld>
 </file>
 
-<file path=ppt/slides/slide17.xml><?xml version="1.0" encoding="utf-8"?>
+<file path=ppt/slides/slide16.xml><?xml version="1.0" encoding="utf-8"?>
 <p:sld xmlns:a="http://schemas.openxmlformats.org/drawingml/2006/main" xmlns:r="http://schemas.openxmlformats.org/officeDocument/2006/relationships" xmlns:p="http://schemas.openxmlformats.org/presentationml/2006/main">
   <p:cSld>
     <p:spTree>
@@ -11758,7 +11660,7 @@
           <p:cNvPr id="2" name="Title 1">
             <a:extLst>
               <a:ext uri="{FF2B5EF4-FFF2-40B4-BE49-F238E27FC236}">
-                <a16:creationId xmlns:a16="http://schemas.microsoft.com/office/drawing/2014/main" xmlns="" id="{118CBBA9-49D2-4262-9114-D0D47E7D522A}"/>
+                <a16:creationId xmlns="" xmlns:a16="http://schemas.microsoft.com/office/drawing/2014/main" id="{118CBBA9-49D2-4262-9114-D0D47E7D522A}"/>
               </a:ext>
             </a:extLst>
           </p:cNvPr>
@@ -11786,7 +11688,7 @@
           <p:cNvPr id="3" name="Content Placeholder 2">
             <a:extLst>
               <a:ext uri="{FF2B5EF4-FFF2-40B4-BE49-F238E27FC236}">
-                <a16:creationId xmlns:a16="http://schemas.microsoft.com/office/drawing/2014/main" xmlns="" id="{1E6F3B36-FA1C-4A44-8799-54720A510D55}"/>
+                <a16:creationId xmlns="" xmlns:a16="http://schemas.microsoft.com/office/drawing/2014/main" id="{1E6F3B36-FA1C-4A44-8799-54720A510D55}"/>
               </a:ext>
             </a:extLst>
           </p:cNvPr>
@@ -11851,7 +11753,7 @@
           <p:cNvPr id="4" name="Table 3">
             <a:extLst>
               <a:ext uri="{FF2B5EF4-FFF2-40B4-BE49-F238E27FC236}">
-                <a16:creationId xmlns:a16="http://schemas.microsoft.com/office/drawing/2014/main" xmlns="" id="{2EDD53C5-AD65-447D-BE6E-F714AFA3AE1B}"/>
+                <a16:creationId xmlns="" xmlns:a16="http://schemas.microsoft.com/office/drawing/2014/main" id="{2EDD53C5-AD65-447D-BE6E-F714AFA3AE1B}"/>
               </a:ext>
             </a:extLst>
           </p:cNvPr>
@@ -11880,21 +11782,21 @@
                 <a:gridCol w="3335657">
                   <a:extLst>
                     <a:ext uri="{9D8B030D-6E8A-4147-A177-3AD203B41FA5}">
-                      <a16:colId xmlns:a16="http://schemas.microsoft.com/office/drawing/2014/main" xmlns="" val="1736827546"/>
+                      <a16:colId xmlns="" xmlns:a16="http://schemas.microsoft.com/office/drawing/2014/main" val="1736827546"/>
                     </a:ext>
                   </a:extLst>
                 </a:gridCol>
                 <a:gridCol w="3336728">
                   <a:extLst>
                     <a:ext uri="{9D8B030D-6E8A-4147-A177-3AD203B41FA5}">
-                      <a16:colId xmlns:a16="http://schemas.microsoft.com/office/drawing/2014/main" xmlns="" val="1009339973"/>
+                      <a16:colId xmlns="" xmlns:a16="http://schemas.microsoft.com/office/drawing/2014/main" val="1009339973"/>
                     </a:ext>
                   </a:extLst>
                 </a:gridCol>
                 <a:gridCol w="3336728">
                   <a:extLst>
                     <a:ext uri="{9D8B030D-6E8A-4147-A177-3AD203B41FA5}">
-                      <a16:colId xmlns:a16="http://schemas.microsoft.com/office/drawing/2014/main" xmlns="" val="3962187885"/>
+                      <a16:colId xmlns="" xmlns:a16="http://schemas.microsoft.com/office/drawing/2014/main" val="3962187885"/>
                     </a:ext>
                   </a:extLst>
                 </a:gridCol>
@@ -12007,7 +11909,7 @@
                 </a:tc>
                 <a:extLst>
                   <a:ext uri="{0D108BD9-81ED-4DB2-BD59-A6C34878D82A}">
-                    <a16:rowId xmlns:a16="http://schemas.microsoft.com/office/drawing/2014/main" xmlns="" val="2209689491"/>
+                    <a16:rowId xmlns="" xmlns:a16="http://schemas.microsoft.com/office/drawing/2014/main" val="2209689491"/>
                   </a:ext>
                 </a:extLst>
               </a:tr>
@@ -12119,7 +12021,7 @@
                 </a:tc>
                 <a:extLst>
                   <a:ext uri="{0D108BD9-81ED-4DB2-BD59-A6C34878D82A}">
-                    <a16:rowId xmlns:a16="http://schemas.microsoft.com/office/drawing/2014/main" xmlns="" val="2597814589"/>
+                    <a16:rowId xmlns="" xmlns:a16="http://schemas.microsoft.com/office/drawing/2014/main" val="2597814589"/>
                   </a:ext>
                 </a:extLst>
               </a:tr>
@@ -12231,7 +12133,7 @@
                 </a:tc>
                 <a:extLst>
                   <a:ext uri="{0D108BD9-81ED-4DB2-BD59-A6C34878D82A}">
-                    <a16:rowId xmlns:a16="http://schemas.microsoft.com/office/drawing/2014/main" xmlns="" val="3437676480"/>
+                    <a16:rowId xmlns="" xmlns:a16="http://schemas.microsoft.com/office/drawing/2014/main" val="3437676480"/>
                   </a:ext>
                 </a:extLst>
               </a:tr>
@@ -12343,7 +12245,7 @@
                 </a:tc>
                 <a:extLst>
                   <a:ext uri="{0D108BD9-81ED-4DB2-BD59-A6C34878D82A}">
-                    <a16:rowId xmlns:a16="http://schemas.microsoft.com/office/drawing/2014/main" xmlns="" val="3450028378"/>
+                    <a16:rowId xmlns="" xmlns:a16="http://schemas.microsoft.com/office/drawing/2014/main" val="3450028378"/>
                   </a:ext>
                 </a:extLst>
               </a:tr>
@@ -12455,7 +12357,7 @@
                 </a:tc>
                 <a:extLst>
                   <a:ext uri="{0D108BD9-81ED-4DB2-BD59-A6C34878D82A}">
-                    <a16:rowId xmlns:a16="http://schemas.microsoft.com/office/drawing/2014/main" xmlns="" val="3281310877"/>
+                    <a16:rowId xmlns="" xmlns:a16="http://schemas.microsoft.com/office/drawing/2014/main" val="3281310877"/>
                   </a:ext>
                 </a:extLst>
               </a:tr>
@@ -12468,7 +12370,7 @@
           <p:cNvPr id="6" name="Content Placeholder 2">
             <a:extLst>
               <a:ext uri="{FF2B5EF4-FFF2-40B4-BE49-F238E27FC236}">
-                <a16:creationId xmlns:a16="http://schemas.microsoft.com/office/drawing/2014/main" xmlns="" id="{5965ECAC-6F10-47C5-A3A2-05D9E4E91D5E}"/>
+                <a16:creationId xmlns="" xmlns:a16="http://schemas.microsoft.com/office/drawing/2014/main" id="{5965ECAC-6F10-47C5-A3A2-05D9E4E91D5E}"/>
               </a:ext>
             </a:extLst>
           </p:cNvPr>
@@ -12731,7 +12633,7 @@
 </p:sld>
 </file>
 
-<file path=ppt/slides/slide18.xml><?xml version="1.0" encoding="utf-8"?>
+<file path=ppt/slides/slide17.xml><?xml version="1.0" encoding="utf-8"?>
 <p:sld xmlns:a="http://schemas.openxmlformats.org/drawingml/2006/main" xmlns:r="http://schemas.openxmlformats.org/officeDocument/2006/relationships" xmlns:p="http://schemas.openxmlformats.org/presentationml/2006/main">
   <p:cSld>
     <p:spTree>
@@ -12753,7 +12655,7 @@
           <p:cNvPr id="2" name="Title 1">
             <a:extLst>
               <a:ext uri="{FF2B5EF4-FFF2-40B4-BE49-F238E27FC236}">
-                <a16:creationId xmlns:a16="http://schemas.microsoft.com/office/drawing/2014/main" xmlns="" id="{118CBBA9-49D2-4262-9114-D0D47E7D522A}"/>
+                <a16:creationId xmlns="" xmlns:a16="http://schemas.microsoft.com/office/drawing/2014/main" id="{118CBBA9-49D2-4262-9114-D0D47E7D522A}"/>
               </a:ext>
             </a:extLst>
           </p:cNvPr>
@@ -12781,7 +12683,7 @@
           <p:cNvPr id="3" name="Content Placeholder 2">
             <a:extLst>
               <a:ext uri="{FF2B5EF4-FFF2-40B4-BE49-F238E27FC236}">
-                <a16:creationId xmlns:a16="http://schemas.microsoft.com/office/drawing/2014/main" xmlns="" id="{1E6F3B36-FA1C-4A44-8799-54720A510D55}"/>
+                <a16:creationId xmlns="" xmlns:a16="http://schemas.microsoft.com/office/drawing/2014/main" id="{1E6F3B36-FA1C-4A44-8799-54720A510D55}"/>
               </a:ext>
             </a:extLst>
           </p:cNvPr>
@@ -12843,7 +12745,7 @@
           <p:cNvPr id="4" name="Table 3">
             <a:extLst>
               <a:ext uri="{FF2B5EF4-FFF2-40B4-BE49-F238E27FC236}">
-                <a16:creationId xmlns:a16="http://schemas.microsoft.com/office/drawing/2014/main" xmlns="" id="{2EDD53C5-AD65-447D-BE6E-F714AFA3AE1B}"/>
+                <a16:creationId xmlns="" xmlns:a16="http://schemas.microsoft.com/office/drawing/2014/main" id="{2EDD53C5-AD65-447D-BE6E-F714AFA3AE1B}"/>
               </a:ext>
             </a:extLst>
           </p:cNvPr>
@@ -12872,21 +12774,21 @@
                 <a:gridCol w="3335657">
                   <a:extLst>
                     <a:ext uri="{9D8B030D-6E8A-4147-A177-3AD203B41FA5}">
-                      <a16:colId xmlns:a16="http://schemas.microsoft.com/office/drawing/2014/main" xmlns="" val="1736827546"/>
+                      <a16:colId xmlns="" xmlns:a16="http://schemas.microsoft.com/office/drawing/2014/main" val="1736827546"/>
                     </a:ext>
                   </a:extLst>
                 </a:gridCol>
                 <a:gridCol w="3336728">
                   <a:extLst>
                     <a:ext uri="{9D8B030D-6E8A-4147-A177-3AD203B41FA5}">
-                      <a16:colId xmlns:a16="http://schemas.microsoft.com/office/drawing/2014/main" xmlns="" val="1009339973"/>
+                      <a16:colId xmlns="" xmlns:a16="http://schemas.microsoft.com/office/drawing/2014/main" val="1009339973"/>
                     </a:ext>
                   </a:extLst>
                 </a:gridCol>
                 <a:gridCol w="3336728">
                   <a:extLst>
                     <a:ext uri="{9D8B030D-6E8A-4147-A177-3AD203B41FA5}">
-                      <a16:colId xmlns:a16="http://schemas.microsoft.com/office/drawing/2014/main" xmlns="" val="3962187885"/>
+                      <a16:colId xmlns="" xmlns:a16="http://schemas.microsoft.com/office/drawing/2014/main" val="3962187885"/>
                     </a:ext>
                   </a:extLst>
                 </a:gridCol>
@@ -12990,7 +12892,7 @@
                 </a:tc>
                 <a:extLst>
                   <a:ext uri="{0D108BD9-81ED-4DB2-BD59-A6C34878D82A}">
-                    <a16:rowId xmlns:a16="http://schemas.microsoft.com/office/drawing/2014/main" xmlns="" val="2209689491"/>
+                    <a16:rowId xmlns="" xmlns:a16="http://schemas.microsoft.com/office/drawing/2014/main" val="2209689491"/>
                   </a:ext>
                 </a:extLst>
               </a:tr>
@@ -13084,7 +12986,7 @@
                 </a:tc>
                 <a:extLst>
                   <a:ext uri="{0D108BD9-81ED-4DB2-BD59-A6C34878D82A}">
-                    <a16:rowId xmlns:a16="http://schemas.microsoft.com/office/drawing/2014/main" xmlns="" val="2597814589"/>
+                    <a16:rowId xmlns="" xmlns:a16="http://schemas.microsoft.com/office/drawing/2014/main" val="2597814589"/>
                   </a:ext>
                 </a:extLst>
               </a:tr>
@@ -13117,7 +13019,7 @@
 </p:sld>
 </file>
 
-<file path=ppt/slides/slide19.xml><?xml version="1.0" encoding="utf-8"?>
+<file path=ppt/slides/slide18.xml><?xml version="1.0" encoding="utf-8"?>
 <p:sld xmlns:a="http://schemas.openxmlformats.org/drawingml/2006/main" xmlns:r="http://schemas.openxmlformats.org/officeDocument/2006/relationships" xmlns:p="http://schemas.openxmlformats.org/presentationml/2006/main" show="0">
   <p:cSld>
     <p:spTree>
@@ -13139,7 +13041,7 @@
           <p:cNvPr id="2" name="Title 1">
             <a:extLst>
               <a:ext uri="{FF2B5EF4-FFF2-40B4-BE49-F238E27FC236}">
-                <a16:creationId xmlns:a16="http://schemas.microsoft.com/office/drawing/2014/main" xmlns="" id="{118CBBA9-49D2-4262-9114-D0D47E7D522A}"/>
+                <a16:creationId xmlns="" xmlns:a16="http://schemas.microsoft.com/office/drawing/2014/main" id="{118CBBA9-49D2-4262-9114-D0D47E7D522A}"/>
               </a:ext>
             </a:extLst>
           </p:cNvPr>
@@ -13167,7 +13069,7 @@
           <p:cNvPr id="3" name="Content Placeholder 2">
             <a:extLst>
               <a:ext uri="{FF2B5EF4-FFF2-40B4-BE49-F238E27FC236}">
-                <a16:creationId xmlns:a16="http://schemas.microsoft.com/office/drawing/2014/main" xmlns="" id="{1E6F3B36-FA1C-4A44-8799-54720A510D55}"/>
+                <a16:creationId xmlns="" xmlns:a16="http://schemas.microsoft.com/office/drawing/2014/main" id="{1E6F3B36-FA1C-4A44-8799-54720A510D55}"/>
               </a:ext>
             </a:extLst>
           </p:cNvPr>
@@ -13262,13 +13164,282 @@
   <p:clrMapOvr>
     <a:masterClrMapping/>
   </p:clrMapOvr>
-  <mc:AlternateContent xmlns:mc="http://schemas.openxmlformats.org/markup-compatibility/2006">
-    <mc:Choice xmlns:p14="http://schemas.microsoft.com/office/powerpoint/2010/main" Requires="p14">
+  <mc:AlternateContent xmlns:mc="http://schemas.openxmlformats.org/markup-compatibility/2006" xmlns:p14="http://schemas.microsoft.com/office/powerpoint/2010/main">
+    <mc:Choice Requires="p14">
       <p:transition spd="med" p14:dur="700">
         <p:fade/>
       </p:transition>
     </mc:Choice>
-    <mc:Fallback>
+    <mc:Fallback xmlns="">
+      <p:transition spd="med">
+        <p:fade/>
+      </p:transition>
+    </mc:Fallback>
+  </mc:AlternateContent>
+</p:sld>
+</file>
+
+<file path=ppt/slides/slide19.xml><?xml version="1.0" encoding="utf-8"?>
+<p:sld xmlns:a="http://schemas.openxmlformats.org/drawingml/2006/main" xmlns:r="http://schemas.openxmlformats.org/officeDocument/2006/relationships" xmlns:p="http://schemas.openxmlformats.org/presentationml/2006/main">
+  <p:cSld>
+    <p:spTree>
+      <p:nvGrpSpPr>
+        <p:cNvPr id="1" name=""/>
+        <p:cNvGrpSpPr/>
+        <p:nvPr/>
+      </p:nvGrpSpPr>
+      <p:grpSpPr>
+        <a:xfrm>
+          <a:off x="0" y="0"/>
+          <a:ext cx="0" cy="0"/>
+          <a:chOff x="0" y="0"/>
+          <a:chExt cx="0" cy="0"/>
+        </a:xfrm>
+      </p:grpSpPr>
+      <p:sp>
+        <p:nvSpPr>
+          <p:cNvPr id="2" name="Title 1">
+            <a:extLst>
+              <a:ext uri="{FF2B5EF4-FFF2-40B4-BE49-F238E27FC236}">
+                <a16:creationId xmlns="" xmlns:a16="http://schemas.microsoft.com/office/drawing/2014/main" id="{118CBBA9-49D2-4262-9114-D0D47E7D522A}"/>
+              </a:ext>
+            </a:extLst>
+          </p:cNvPr>
+          <p:cNvSpPr>
+            <a:spLocks noGrp="1"/>
+          </p:cNvSpPr>
+          <p:nvPr>
+            <p:ph type="title"/>
+          </p:nvPr>
+        </p:nvSpPr>
+        <p:spPr/>
+        <p:txBody>
+          <a:bodyPr/>
+          <a:lstStyle/>
+          <a:p>
+            <a:r>
+              <a:rPr lang="en-AU" b="1" dirty="0" smtClean="0"/>
+              <a:t>We found…</a:t>
+            </a:r>
+            <a:endParaRPr lang="en-AU" dirty="0"/>
+          </a:p>
+        </p:txBody>
+      </p:sp>
+      <p:sp>
+        <p:nvSpPr>
+          <p:cNvPr id="3" name="Content Placeholder 2">
+            <a:extLst>
+              <a:ext uri="{FF2B5EF4-FFF2-40B4-BE49-F238E27FC236}">
+                <a16:creationId xmlns="" xmlns:a16="http://schemas.microsoft.com/office/drawing/2014/main" id="{1E6F3B36-FA1C-4A44-8799-54720A510D55}"/>
+              </a:ext>
+            </a:extLst>
+          </p:cNvPr>
+          <p:cNvSpPr>
+            <a:spLocks noGrp="1"/>
+          </p:cNvSpPr>
+          <p:nvPr>
+            <p:ph idx="1"/>
+          </p:nvPr>
+        </p:nvSpPr>
+        <p:spPr>
+          <a:xfrm>
+            <a:off x="1218883" y="1701797"/>
+            <a:ext cx="10564161" cy="4462272"/>
+          </a:xfrm>
+        </p:spPr>
+        <p:txBody>
+          <a:bodyPr>
+            <a:normAutofit fontScale="70000" lnSpcReduction="20000"/>
+          </a:bodyPr>
+          <a:lstStyle/>
+          <a:p>
+            <a:r>
+              <a:rPr lang="en-AU" dirty="0"/>
+              <a:t>Resnet34 </a:t>
+            </a:r>
+            <a:r>
+              <a:rPr lang="en-AU" dirty="0" smtClean="0"/>
+              <a:t>architecture is adequate</a:t>
+            </a:r>
+            <a:endParaRPr lang="en-AU" dirty="0"/>
+          </a:p>
+          <a:p>
+            <a:r>
+              <a:rPr lang="en-AU" dirty="0"/>
+              <a:t>First </a:t>
+            </a:r>
+            <a:r>
+              <a:rPr lang="en-AU" dirty="0" smtClean="0"/>
+              <a:t>training epoch (last layer only): </a:t>
+            </a:r>
+            <a:r>
+              <a:rPr lang="en-AU" dirty="0"/>
+              <a:t>86.4% accuracy</a:t>
+            </a:r>
+          </a:p>
+          <a:p>
+            <a:r>
+              <a:rPr lang="en-AU" dirty="0"/>
+              <a:t>False </a:t>
+            </a:r>
+            <a:r>
+              <a:rPr lang="en-AU" dirty="0">
+                <a:solidFill>
+                  <a:srgbClr val="FF0000"/>
+                </a:solidFill>
+              </a:rPr>
+              <a:t>negatives</a:t>
+            </a:r>
+            <a:r>
+              <a:rPr lang="en-AU" dirty="0"/>
+              <a:t> generally </a:t>
+            </a:r>
+            <a:r>
+              <a:rPr lang="en-AU" dirty="0" smtClean="0"/>
+              <a:t>occurred </a:t>
+            </a:r>
+            <a:r>
+              <a:rPr lang="en-AU" dirty="0"/>
+              <a:t>where panel edges </a:t>
+            </a:r>
+            <a:r>
+              <a:rPr lang="en-AU" dirty="0" smtClean="0"/>
+              <a:t>were not visible</a:t>
+            </a:r>
+            <a:endParaRPr lang="en-AU" dirty="0"/>
+          </a:p>
+          <a:p>
+            <a:r>
+              <a:rPr lang="en-AU" dirty="0"/>
+              <a:t>False </a:t>
+            </a:r>
+            <a:r>
+              <a:rPr lang="en-AU" dirty="0">
+                <a:solidFill>
+                  <a:schemeClr val="accent1">
+                    <a:lumMod val="60000"/>
+                    <a:lumOff val="40000"/>
+                  </a:schemeClr>
+                </a:solidFill>
+              </a:rPr>
+              <a:t>positives</a:t>
+            </a:r>
+            <a:r>
+              <a:rPr lang="en-AU" dirty="0"/>
+              <a:t> generally occur on grid-like </a:t>
+            </a:r>
+            <a:r>
+              <a:rPr lang="en-AU" dirty="0" smtClean="0"/>
+              <a:t>structures (tiles, pergolas </a:t>
+            </a:r>
+            <a:r>
+              <a:rPr lang="en-AU" dirty="0" err="1" smtClean="0"/>
+              <a:t>etc</a:t>
+            </a:r>
+            <a:r>
+              <a:rPr lang="en-AU" dirty="0" smtClean="0"/>
+              <a:t>)</a:t>
+            </a:r>
+            <a:endParaRPr lang="en-AU" dirty="0"/>
+          </a:p>
+          <a:p>
+            <a:r>
+              <a:rPr lang="en-AU" dirty="0"/>
+              <a:t>Learning rate utilising SGDR on final layer provides small improvement: 88.6%</a:t>
+            </a:r>
+          </a:p>
+          <a:p>
+            <a:r>
+              <a:rPr lang="en-AU" dirty="0"/>
+              <a:t>SGDR with differential learning rates yields </a:t>
+            </a:r>
+            <a:r>
+              <a:rPr lang="en-AU" u="sng" dirty="0"/>
+              <a:t>significant</a:t>
+            </a:r>
+            <a:r>
+              <a:rPr lang="en-AU" dirty="0"/>
+              <a:t> accuracy </a:t>
+            </a:r>
+            <a:r>
+              <a:rPr lang="en-AU" dirty="0" smtClean="0"/>
+              <a:t>increase</a:t>
+            </a:r>
+          </a:p>
+          <a:p>
+            <a:pPr lvl="1"/>
+            <a:r>
+              <a:rPr lang="en-AU" dirty="0" smtClean="0"/>
+              <a:t>Layers were unfrozen, and the last 3 layers were re-trained until overfitting (train loss &gt; validation loss)</a:t>
+            </a:r>
+          </a:p>
+          <a:p>
+            <a:pPr lvl="1"/>
+            <a:r>
+              <a:rPr lang="en-AU" dirty="0" smtClean="0"/>
+              <a:t>Significant </a:t>
+            </a:r>
+            <a:r>
+              <a:rPr lang="en-AU" dirty="0"/>
+              <a:t>accuracy </a:t>
+            </a:r>
+            <a:r>
+              <a:rPr lang="en-AU" dirty="0" smtClean="0"/>
+              <a:t>improvement</a:t>
+            </a:r>
+            <a:r>
+              <a:rPr lang="en-AU" dirty="0"/>
+              <a:t> </a:t>
+            </a:r>
+            <a:r>
+              <a:rPr lang="en-AU" dirty="0" smtClean="0"/>
+              <a:t>(97.3%), however the risk of overfitting may be high</a:t>
+            </a:r>
+          </a:p>
+          <a:p>
+            <a:r>
+              <a:rPr lang="en-AU" dirty="0" smtClean="0"/>
+              <a:t>TTA </a:t>
+            </a:r>
+            <a:r>
+              <a:rPr lang="en-AU" dirty="0"/>
+              <a:t>provides small benefit: 97.8% </a:t>
+            </a:r>
+            <a:r>
+              <a:rPr lang="en-AU" dirty="0" smtClean="0"/>
+              <a:t>accuracy (+0.5%)</a:t>
+            </a:r>
+          </a:p>
+          <a:p>
+            <a:r>
+              <a:rPr lang="en-AU" dirty="0" smtClean="0"/>
+              <a:t>Rectangular imagery and multi-residential imagery will require additional care, and likely image segmentation. Was not explored, as this would have formed Part B scope.</a:t>
+            </a:r>
+            <a:endParaRPr lang="en-AU" dirty="0"/>
+          </a:p>
+          <a:p>
+            <a:pPr lvl="1"/>
+            <a:endParaRPr lang="en-AU" dirty="0"/>
+          </a:p>
+        </p:txBody>
+      </p:sp>
+    </p:spTree>
+    <p:extLst>
+      <p:ext uri="{BB962C8B-B14F-4D97-AF65-F5344CB8AC3E}">
+        <p14:creationId xmlns:p14="http://schemas.microsoft.com/office/powerpoint/2010/main" val="796037558"/>
+      </p:ext>
+    </p:extLst>
+  </p:cSld>
+  <p:clrMapOvr>
+    <a:masterClrMapping/>
+  </p:clrMapOvr>
+  <mc:AlternateContent xmlns:mc="http://schemas.openxmlformats.org/markup-compatibility/2006" xmlns:p14="http://schemas.microsoft.com/office/powerpoint/2010/main">
+    <mc:Choice Requires="p14">
+      <p:transition spd="med" p14:dur="700">
+        <p:fade/>
+      </p:transition>
+    </mc:Choice>
+    <mc:Fallback xmlns="">
       <p:transition spd="med">
         <p:fade/>
       </p:transition>
@@ -13299,7 +13470,7 @@
           <p:cNvPr id="4" name="Content Placeholder 2">
             <a:extLst>
               <a:ext uri="{FF2B5EF4-FFF2-40B4-BE49-F238E27FC236}">
-                <a16:creationId xmlns:a16="http://schemas.microsoft.com/office/drawing/2014/main" xmlns="" id="{1E6F3B36-FA1C-4A44-8799-54720A510D55}"/>
+                <a16:creationId xmlns="" xmlns:a16="http://schemas.microsoft.com/office/drawing/2014/main" id="{1E6F3B36-FA1C-4A44-8799-54720A510D55}"/>
               </a:ext>
             </a:extLst>
           </p:cNvPr>
@@ -13552,8 +13723,21 @@
             </a:pPr>
             <a:r>
               <a:rPr lang="en-AU" sz="2000" dirty="0" smtClean="0"/>
-              <a:t>Electrical Engineer looking to broaden her skillset and apply learnings from fast.ai</a:t>
-            </a:r>
+              <a:t>Electrical </a:t>
+            </a:r>
+            <a:r>
+              <a:rPr lang="en-AU" sz="2000" dirty="0" smtClean="0"/>
+              <a:t>Engineer (Western Power) </a:t>
+            </a:r>
+            <a:r>
+              <a:rPr lang="en-AU" sz="2000" dirty="0" smtClean="0"/>
+              <a:t>looking to broaden her skillset and apply learnings from </a:t>
+            </a:r>
+            <a:r>
+              <a:rPr lang="en-AU" sz="2000" dirty="0" smtClean="0"/>
+              <a:t>fast.ai.</a:t>
+            </a:r>
+            <a:endParaRPr lang="en-AU" sz="2000" dirty="0" smtClean="0"/>
           </a:p>
           <a:p>
             <a:pPr>
@@ -13588,16 +13772,13 @@
               <a:buFontTx/>
               <a:buChar char="-"/>
             </a:pPr>
-            <a:endParaRPr lang="en-AU" dirty="0"/>
-          </a:p>
-          <a:p>
-            <a:pPr>
-              <a:buFontTx/>
-              <a:buChar char="-"/>
-            </a:pPr>
             <a:r>
               <a:rPr lang="en-AU" dirty="0" smtClean="0"/>
-              <a:t>Adrian Goldberg</a:t>
+              <a:t>Adrian </a:t>
+            </a:r>
+            <a:r>
+              <a:rPr lang="en-AU" dirty="0" smtClean="0"/>
+              <a:t>Goldberg</a:t>
             </a:r>
           </a:p>
           <a:p>
@@ -13659,53 +13840,10 @@
               <a:buNone/>
             </a:pPr>
             <a:r>
-              <a:rPr lang="en-AU" sz="2000" dirty="0" err="1"/>
-              <a:t>Lorum</a:t>
-            </a:r>
-            <a:r>
-              <a:rPr lang="en-AU" sz="2000" dirty="0"/>
-              <a:t> ipsum </a:t>
-            </a:r>
-            <a:r>
-              <a:rPr lang="en-AU" sz="2000" dirty="0" err="1"/>
-              <a:t>lorum</a:t>
-            </a:r>
-            <a:r>
-              <a:rPr lang="en-AU" sz="2000" dirty="0"/>
-              <a:t> ipsum </a:t>
-            </a:r>
-            <a:r>
-              <a:rPr lang="en-AU" sz="2000" dirty="0" err="1"/>
-              <a:t>lorum</a:t>
-            </a:r>
-            <a:r>
-              <a:rPr lang="en-AU" sz="2000" dirty="0"/>
-              <a:t> ipsum </a:t>
-            </a:r>
-            <a:r>
-              <a:rPr lang="en-AU" sz="2000" dirty="0" err="1"/>
-              <a:t>lorum</a:t>
-            </a:r>
-            <a:r>
-              <a:rPr lang="en-AU" sz="2000" dirty="0"/>
-              <a:t> ipsum </a:t>
-            </a:r>
-            <a:r>
-              <a:rPr lang="en-AU" sz="2000" dirty="0" err="1"/>
-              <a:t>lorum</a:t>
-            </a:r>
-            <a:r>
-              <a:rPr lang="en-AU" sz="2000" dirty="0"/>
-              <a:t> ipsum </a:t>
-            </a:r>
-            <a:r>
-              <a:rPr lang="en-AU" sz="2000" dirty="0" err="1"/>
-              <a:t>lorum</a:t>
-            </a:r>
-            <a:r>
-              <a:rPr lang="en-AU" sz="2000" dirty="0"/>
-              <a:t> ipsum </a:t>
-            </a:r>
+              <a:rPr lang="en-AU" sz="2000" dirty="0" smtClean="0"/>
+              <a:t>Data Strategy Analyst (Western Power) looking to expand personal skills.</a:t>
+            </a:r>
+            <a:endParaRPr lang="en-AU" sz="2000" dirty="0"/>
           </a:p>
           <a:p>
             <a:pPr marL="0" indent="0">
@@ -13737,8 +13875,96 @@
         </p:blipFill>
         <p:spPr>
           <a:xfrm>
-            <a:off x="1413892" y="2816437"/>
-            <a:ext cx="2235385" cy="2083891"/>
+            <a:off x="1053852" y="3180539"/>
+            <a:ext cx="2654605" cy="2474700"/>
+          </a:xfrm>
+          <a:prstGeom prst="rect">
+            <a:avLst/>
+          </a:prstGeom>
+          <a:ln w="38100" cap="sq">
+            <a:solidFill>
+              <a:srgbClr val="000000"/>
+            </a:solidFill>
+            <a:prstDash val="solid"/>
+            <a:miter lim="800000"/>
+          </a:ln>
+          <a:effectLst>
+            <a:outerShdw blurRad="50800" dist="38100" dir="2700000" algn="tl" rotWithShape="0">
+              <a:srgbClr val="000000">
+                <a:alpha val="43000"/>
+              </a:srgbClr>
+            </a:outerShdw>
+          </a:effectLst>
+        </p:spPr>
+      </p:pic>
+      <p:pic>
+        <p:nvPicPr>
+          <p:cNvPr id="2" name="Picture 1"/>
+          <p:cNvPicPr>
+            <a:picLocks noChangeAspect="1"/>
+          </p:cNvPicPr>
+          <p:nvPr/>
+        </p:nvPicPr>
+        <p:blipFill>
+          <a:blip r:embed="rId3">
+            <a:extLst>
+              <a:ext uri="{28A0092B-C50C-407E-A947-70E740481C1C}">
+                <a14:useLocalDpi xmlns:a14="http://schemas.microsoft.com/office/drawing/2010/main" val="0"/>
+              </a:ext>
+            </a:extLst>
+          </a:blip>
+          <a:stretch>
+            <a:fillRect/>
+          </a:stretch>
+        </p:blipFill>
+        <p:spPr>
+          <a:xfrm>
+            <a:off x="8902724" y="3113073"/>
+            <a:ext cx="1841784" cy="2474700"/>
+          </a:xfrm>
+          <a:prstGeom prst="rect">
+            <a:avLst/>
+          </a:prstGeom>
+          <a:ln w="38100" cap="sq">
+            <a:solidFill>
+              <a:srgbClr val="000000"/>
+            </a:solidFill>
+            <a:prstDash val="solid"/>
+            <a:miter lim="800000"/>
+          </a:ln>
+          <a:effectLst>
+            <a:outerShdw blurRad="50800" dist="38100" dir="2700000" algn="tl" rotWithShape="0">
+              <a:srgbClr val="000000">
+                <a:alpha val="43000"/>
+              </a:srgbClr>
+            </a:outerShdw>
+          </a:effectLst>
+        </p:spPr>
+      </p:pic>
+      <p:pic>
+        <p:nvPicPr>
+          <p:cNvPr id="3" name="Picture 2"/>
+          <p:cNvPicPr>
+            <a:picLocks noChangeAspect="1"/>
+          </p:cNvPicPr>
+          <p:nvPr/>
+        </p:nvPicPr>
+        <p:blipFill>
+          <a:blip r:embed="rId4" cstate="print">
+            <a:extLst>
+              <a:ext uri="{28A0092B-C50C-407E-A947-70E740481C1C}">
+                <a14:useLocalDpi xmlns:a14="http://schemas.microsoft.com/office/drawing/2010/main" val="0"/>
+              </a:ext>
+            </a:extLst>
+          </a:blip>
+          <a:stretch>
+            <a:fillRect/>
+          </a:stretch>
+        </p:blipFill>
+        <p:spPr>
+          <a:xfrm>
+            <a:off x="4654252" y="2816437"/>
+            <a:ext cx="2791837" cy="3202905"/>
           </a:xfrm>
           <a:prstGeom prst="rect">
             <a:avLst/>
@@ -13803,39 +14029,10 @@
       </p:grpSpPr>
       <p:sp>
         <p:nvSpPr>
-          <p:cNvPr id="2" name="Title 1">
-            <a:extLst>
-              <a:ext uri="{FF2B5EF4-FFF2-40B4-BE49-F238E27FC236}">
-                <a16:creationId xmlns:a16="http://schemas.microsoft.com/office/drawing/2014/main" xmlns="" id="{118CBBA9-49D2-4262-9114-D0D47E7D522A}"/>
-              </a:ext>
-            </a:extLst>
-          </p:cNvPr>
-          <p:cNvSpPr>
-            <a:spLocks noGrp="1"/>
-          </p:cNvSpPr>
-          <p:nvPr>
-            <p:ph type="title"/>
-          </p:nvPr>
-        </p:nvSpPr>
-        <p:spPr/>
-        <p:txBody>
-          <a:bodyPr/>
-          <a:lstStyle/>
-          <a:p>
-            <a:r>
-              <a:rPr lang="en-AU" b="1" dirty="0" smtClean="0"/>
-              <a:t>We found…</a:t>
-            </a:r>
-            <a:endParaRPr lang="en-AU" dirty="0"/>
-          </a:p>
-        </p:txBody>
-      </p:sp>
-      <p:sp>
-        <p:nvSpPr>
           <p:cNvPr id="3" name="Content Placeholder 2">
             <a:extLst>
               <a:ext uri="{FF2B5EF4-FFF2-40B4-BE49-F238E27FC236}">
-                <a16:creationId xmlns:a16="http://schemas.microsoft.com/office/drawing/2014/main" xmlns="" id="{1E6F3B36-FA1C-4A44-8799-54720A510D55}"/>
+                <a16:creationId xmlns="" xmlns:a16="http://schemas.microsoft.com/office/drawing/2014/main" id="{1E6F3B36-FA1C-4A44-8799-54720A510D55}"/>
               </a:ext>
             </a:extLst>
           </p:cNvPr>
@@ -13849,185 +14046,115 @@
         <p:spPr>
           <a:xfrm>
             <a:off x="1218883" y="1701797"/>
-            <a:ext cx="10564161" cy="4462272"/>
+            <a:ext cx="10360501" cy="4823547"/>
           </a:xfrm>
         </p:spPr>
         <p:txBody>
           <a:bodyPr>
-            <a:normAutofit fontScale="70000" lnSpcReduction="20000"/>
+            <a:normAutofit/>
           </a:bodyPr>
           <a:lstStyle/>
           <a:p>
             <a:r>
               <a:rPr lang="en-AU" dirty="0"/>
-              <a:t>Resnet34 </a:t>
-            </a:r>
+              <a:t>Significant dropout:</a:t>
+            </a:r>
+          </a:p>
+          <a:p>
+            <a:pPr lvl="1"/>
             <a:r>
               <a:rPr lang="en-AU" dirty="0" smtClean="0"/>
-              <a:t>architecture is adequate</a:t>
-            </a:r>
-            <a:endParaRPr lang="en-AU" dirty="0"/>
+              <a:t>Assumed dropout would improve generalisation of solar panels and reduce false positives</a:t>
+            </a:r>
+          </a:p>
+          <a:p>
+            <a:r>
+              <a:rPr lang="en-AU" dirty="0" smtClean="0"/>
+              <a:t>Data augmentation</a:t>
+            </a:r>
+          </a:p>
+          <a:p>
+            <a:pPr lvl="1"/>
+            <a:r>
+              <a:rPr lang="en-AU" dirty="0" smtClean="0"/>
+              <a:t>With blur – similar principle to the above – seemed to be counterproductive by reducing accuracy</a:t>
+            </a:r>
+          </a:p>
+          <a:p>
+            <a:pPr lvl="1"/>
+            <a:r>
+              <a:rPr lang="en-AU" dirty="0" smtClean="0"/>
+              <a:t>30 degree image tilt – To better generalise house (and by proxy panel) positioning – reduced the validation set accuracy</a:t>
+            </a:r>
           </a:p>
           <a:p>
             <a:r>
               <a:rPr lang="en-AU" dirty="0"/>
-              <a:t>First </a:t>
-            </a:r>
-            <a:r>
-              <a:rPr lang="en-AU" dirty="0" smtClean="0"/>
-              <a:t>training epoch (last layer only): </a:t>
-            </a:r>
-            <a:r>
-              <a:rPr lang="en-AU" dirty="0"/>
-              <a:t>86.4% accuracy</a:t>
-            </a:r>
-          </a:p>
-          <a:p>
-            <a:r>
-              <a:rPr lang="en-AU" dirty="0"/>
-              <a:t>False </a:t>
-            </a:r>
-            <a:r>
-              <a:rPr lang="en-AU" dirty="0">
-                <a:solidFill>
-                  <a:srgbClr val="FF0000"/>
-                </a:solidFill>
-              </a:rPr>
-              <a:t>negatives</a:t>
-            </a:r>
-            <a:r>
-              <a:rPr lang="en-AU" dirty="0"/>
-              <a:t> generally </a:t>
-            </a:r>
-            <a:r>
-              <a:rPr lang="en-AU" dirty="0" smtClean="0"/>
-              <a:t>occurred </a:t>
-            </a:r>
-            <a:r>
-              <a:rPr lang="en-AU" dirty="0"/>
-              <a:t>where panel edges </a:t>
-            </a:r>
-            <a:r>
-              <a:rPr lang="en-AU" dirty="0" smtClean="0"/>
-              <a:t>were not visible</a:t>
-            </a:r>
-            <a:endParaRPr lang="en-AU" dirty="0"/>
-          </a:p>
-          <a:p>
-            <a:r>
-              <a:rPr lang="en-AU" dirty="0"/>
-              <a:t>False </a:t>
-            </a:r>
-            <a:r>
-              <a:rPr lang="en-AU" dirty="0">
-                <a:solidFill>
-                  <a:schemeClr val="accent1">
-                    <a:lumMod val="60000"/>
-                    <a:lumOff val="40000"/>
-                  </a:schemeClr>
-                </a:solidFill>
-              </a:rPr>
-              <a:t>positives</a:t>
-            </a:r>
-            <a:r>
-              <a:rPr lang="en-AU" dirty="0"/>
-              <a:t> generally occur on grid-like </a:t>
-            </a:r>
-            <a:r>
-              <a:rPr lang="en-AU" dirty="0" smtClean="0"/>
-              <a:t>structures (tiles, pergolas </a:t>
-            </a:r>
-            <a:r>
-              <a:rPr lang="en-AU" dirty="0" err="1" smtClean="0"/>
-              <a:t>etc</a:t>
-            </a:r>
-            <a:r>
-              <a:rPr lang="en-AU" dirty="0" smtClean="0"/>
-              <a:t>)</a:t>
-            </a:r>
-            <a:endParaRPr lang="en-AU" dirty="0"/>
-          </a:p>
-          <a:p>
-            <a:r>
-              <a:rPr lang="en-AU" dirty="0"/>
-              <a:t>Learning rate utilising SGDR on final layer provides small improvement: 88.6%</a:t>
-            </a:r>
-          </a:p>
-          <a:p>
-            <a:r>
-              <a:rPr lang="en-AU" dirty="0"/>
-              <a:t>SGDR with differential learning rates yields </a:t>
-            </a:r>
-            <a:r>
-              <a:rPr lang="en-AU" u="sng" dirty="0"/>
-              <a:t>significant</a:t>
-            </a:r>
-            <a:r>
-              <a:rPr lang="en-AU" dirty="0"/>
-              <a:t> accuracy </a:t>
+              <a:t>Moving up to a ResNet50 model took far longer to train but did not yield a performance </a:t>
             </a:r>
             <a:r>
               <a:rPr lang="en-AU" dirty="0" smtClean="0"/>
               <a:t>increase</a:t>
             </a:r>
+            <a:endParaRPr lang="en-AU" dirty="0"/>
           </a:p>
           <a:p>
             <a:pPr lvl="1"/>
+            <a:endParaRPr lang="en-AU" dirty="0"/>
+          </a:p>
+        </p:txBody>
+      </p:sp>
+      <p:sp>
+        <p:nvSpPr>
+          <p:cNvPr id="5" name="Title 1">
+            <a:extLst>
+              <a:ext uri="{FF2B5EF4-FFF2-40B4-BE49-F238E27FC236}">
+                <a16:creationId xmlns="" xmlns:a16="http://schemas.microsoft.com/office/drawing/2014/main" id="{118CBBA9-49D2-4262-9114-D0D47E7D522A}"/>
+              </a:ext>
+            </a:extLst>
+          </p:cNvPr>
+          <p:cNvSpPr txBox="1">
+            <a:spLocks/>
+          </p:cNvSpPr>
+          <p:nvPr/>
+        </p:nvSpPr>
+        <p:spPr>
+          <a:xfrm>
+            <a:off x="1371283" y="427037"/>
+            <a:ext cx="10360501" cy="1223963"/>
+          </a:xfrm>
+          <a:prstGeom prst="rect">
+            <a:avLst/>
+          </a:prstGeom>
+        </p:spPr>
+        <p:txBody>
+          <a:bodyPr vert="horz" lIns="121899" tIns="60949" rIns="121899" bIns="60949" rtlCol="0" anchor="b">
+            <a:normAutofit/>
+          </a:bodyPr>
+          <a:lstStyle>
+            <a:lvl1pPr algn="l" defTabSz="1218987" rtl="0" eaLnBrk="1" latinLnBrk="0" hangingPunct="1">
+              <a:lnSpc>
+                <a:spcPct val="90000"/>
+              </a:lnSpc>
+              <a:spcBef>
+                <a:spcPct val="0"/>
+              </a:spcBef>
+              <a:buNone/>
+              <a:defRPr sz="3600" kern="1200">
+                <a:solidFill>
+                  <a:schemeClr val="tx1"/>
+                </a:solidFill>
+                <a:latin typeface="+mj-lt"/>
+                <a:ea typeface="+mj-ea"/>
+                <a:cs typeface="+mj-cs"/>
+              </a:defRPr>
+            </a:lvl1pPr>
+          </a:lstStyle>
+          <a:p>
             <a:r>
               <a:rPr lang="en-AU" dirty="0" smtClean="0"/>
-              <a:t>Layers were unfrozen, and the last 3 layers were re-trained until overfitting (train loss &gt; validation loss)</a:t>
-            </a:r>
-          </a:p>
-          <a:p>
-            <a:pPr lvl="1"/>
-            <a:r>
-              <a:rPr lang="en-AU" dirty="0" smtClean="0"/>
-              <a:t>Significant </a:t>
-            </a:r>
-            <a:r>
-              <a:rPr lang="en-AU" dirty="0"/>
-              <a:t>accuracy </a:t>
-            </a:r>
-            <a:r>
-              <a:rPr lang="en-AU" dirty="0" smtClean="0"/>
-              <a:t>improvement</a:t>
-            </a:r>
-            <a:r>
-              <a:rPr lang="en-AU" dirty="0"/>
-              <a:t> </a:t>
-            </a:r>
-            <a:r>
-              <a:rPr lang="en-AU" dirty="0" smtClean="0"/>
-              <a:t>(97.3%), however the risk of overfitting may be high</a:t>
-            </a:r>
-          </a:p>
-          <a:p>
-            <a:r>
-              <a:rPr lang="en-AU" dirty="0" smtClean="0"/>
-              <a:t>TTA </a:t>
-            </a:r>
-            <a:r>
-              <a:rPr lang="en-AU" dirty="0"/>
-              <a:t>provides small benefit: 97.8% </a:t>
-            </a:r>
-            <a:r>
-              <a:rPr lang="en-AU" dirty="0" smtClean="0"/>
-              <a:t>accuracy (+0.5%)</a:t>
-            </a:r>
-          </a:p>
-          <a:p>
-            <a:r>
-              <a:rPr lang="en-AU" dirty="0" smtClean="0"/>
-              <a:t>Rectangular imagery and multi-residential imagery will require additional care, and likely image segmentation. </a:t>
-            </a:r>
-            <a:r>
-              <a:rPr lang="en-AU" dirty="0" smtClean="0"/>
-              <a:t>Was not explored, as this would have formed Part B scope.</a:t>
-            </a:r>
-            <a:endParaRPr lang="en-AU" dirty="0"/>
-          </a:p>
-          <a:p>
-            <a:pPr lvl="1"/>
+              <a:t>What didn’t work...</a:t>
+            </a:r>
             <a:endParaRPr lang="en-AU" dirty="0"/>
           </a:p>
         </p:txBody>
@@ -14035,7 +14162,7 @@
     </p:spTree>
     <p:extLst>
       <p:ext uri="{BB962C8B-B14F-4D97-AF65-F5344CB8AC3E}">
-        <p14:creationId xmlns:p14="http://schemas.microsoft.com/office/powerpoint/2010/main" val="796037558"/>
+        <p14:creationId xmlns:p14="http://schemas.microsoft.com/office/powerpoint/2010/main" val="2709229914"/>
       </p:ext>
     </p:extLst>
   </p:cSld>
@@ -14076,10 +14203,39 @@
       </p:grpSpPr>
       <p:sp>
         <p:nvSpPr>
+          <p:cNvPr id="2" name="Title 1">
+            <a:extLst>
+              <a:ext uri="{FF2B5EF4-FFF2-40B4-BE49-F238E27FC236}">
+                <a16:creationId xmlns="" xmlns:a16="http://schemas.microsoft.com/office/drawing/2014/main" id="{118CBBA9-49D2-4262-9114-D0D47E7D522A}"/>
+              </a:ext>
+            </a:extLst>
+          </p:cNvPr>
+          <p:cNvSpPr>
+            <a:spLocks noGrp="1"/>
+          </p:cNvSpPr>
+          <p:nvPr>
+            <p:ph type="title"/>
+          </p:nvPr>
+        </p:nvSpPr>
+        <p:spPr/>
+        <p:txBody>
+          <a:bodyPr/>
+          <a:lstStyle/>
+          <a:p>
+            <a:r>
+              <a:rPr lang="en-AU" b="1" dirty="0" smtClean="0"/>
+              <a:t>We learned…</a:t>
+            </a:r>
+            <a:endParaRPr lang="en-AU" dirty="0"/>
+          </a:p>
+        </p:txBody>
+      </p:sp>
+      <p:sp>
+        <p:nvSpPr>
           <p:cNvPr id="3" name="Content Placeholder 2">
             <a:extLst>
               <a:ext uri="{FF2B5EF4-FFF2-40B4-BE49-F238E27FC236}">
-                <a16:creationId xmlns:a16="http://schemas.microsoft.com/office/drawing/2014/main" xmlns="" id="{1E6F3B36-FA1C-4A44-8799-54720A510D55}"/>
+                <a16:creationId xmlns="" xmlns:a16="http://schemas.microsoft.com/office/drawing/2014/main" id="{1E6F3B36-FA1C-4A44-8799-54720A510D55}"/>
               </a:ext>
             </a:extLst>
           </p:cNvPr>
@@ -14093,115 +14249,38 @@
         <p:spPr>
           <a:xfrm>
             <a:off x="1218883" y="1701797"/>
-            <a:ext cx="10360501" cy="4823547"/>
+            <a:ext cx="10564161" cy="4462272"/>
           </a:xfrm>
         </p:spPr>
         <p:txBody>
-          <a:bodyPr>
-            <a:normAutofit/>
-          </a:bodyPr>
+          <a:bodyPr/>
           <a:lstStyle/>
           <a:p>
             <a:r>
-              <a:rPr lang="en-AU" dirty="0"/>
-              <a:t>Significant dropout:</a:t>
-            </a:r>
-          </a:p>
-          <a:p>
-            <a:pPr lvl="1"/>
-            <a:r>
               <a:rPr lang="en-AU" dirty="0" smtClean="0"/>
-              <a:t>Assumed dropout would improve generalisation of solar panels and reduce false positives</a:t>
+              <a:t>Following the basic fast.ai principles yields generally accurate CV results</a:t>
             </a:r>
           </a:p>
           <a:p>
             <a:r>
               <a:rPr lang="en-AU" dirty="0" smtClean="0"/>
-              <a:t>Data augmentation</a:t>
-            </a:r>
-          </a:p>
-          <a:p>
-            <a:pPr lvl="1"/>
+              <a:t>Minimising data augmentation helped</a:t>
+            </a:r>
+          </a:p>
+          <a:p>
             <a:r>
               <a:rPr lang="en-AU" dirty="0" smtClean="0"/>
-              <a:t>With blur – similar principle to the above – seemed to be counterproductive by reducing accuracy</a:t>
-            </a:r>
-          </a:p>
-          <a:p>
-            <a:pPr lvl="1"/>
+              <a:t>Randomising the test set and validation set to check yielded model results are not a fluke</a:t>
+            </a:r>
+            <a:endParaRPr lang="en-AU" dirty="0"/>
+          </a:p>
+          <a:p>
             <a:r>
               <a:rPr lang="en-AU" dirty="0" smtClean="0"/>
-              <a:t>30 degree image tilt – To better generalise house (and by proxy panel) positioning – reduced the validation set accuracy</a:t>
-            </a:r>
-          </a:p>
-          <a:p>
-            <a:r>
-              <a:rPr lang="en-AU" dirty="0"/>
-              <a:t>Moving up to a ResNet50 model took far longer to train but did not yield a performance </a:t>
-            </a:r>
-            <a:r>
-              <a:rPr lang="en-AU" dirty="0" smtClean="0"/>
-              <a:t>increase</a:t>
-            </a:r>
-            <a:endParaRPr lang="en-AU" dirty="0"/>
-          </a:p>
-          <a:p>
-            <a:pPr lvl="1"/>
-            <a:endParaRPr lang="en-AU" dirty="0"/>
-          </a:p>
-        </p:txBody>
-      </p:sp>
-      <p:sp>
-        <p:nvSpPr>
-          <p:cNvPr id="5" name="Title 1">
-            <a:extLst>
-              <a:ext uri="{FF2B5EF4-FFF2-40B4-BE49-F238E27FC236}">
-                <a16:creationId xmlns:a16="http://schemas.microsoft.com/office/drawing/2014/main" xmlns="" id="{118CBBA9-49D2-4262-9114-D0D47E7D522A}"/>
-              </a:ext>
-            </a:extLst>
-          </p:cNvPr>
-          <p:cNvSpPr txBox="1">
-            <a:spLocks/>
-          </p:cNvSpPr>
-          <p:nvPr/>
-        </p:nvSpPr>
-        <p:spPr>
-          <a:xfrm>
-            <a:off x="1371283" y="427037"/>
-            <a:ext cx="10360501" cy="1223963"/>
-          </a:xfrm>
-          <a:prstGeom prst="rect">
-            <a:avLst/>
-          </a:prstGeom>
-        </p:spPr>
-        <p:txBody>
-          <a:bodyPr vert="horz" lIns="121899" tIns="60949" rIns="121899" bIns="60949" rtlCol="0" anchor="b">
-            <a:normAutofit/>
-          </a:bodyPr>
-          <a:lstStyle>
-            <a:lvl1pPr algn="l" defTabSz="1218987" rtl="0" eaLnBrk="1" latinLnBrk="0" hangingPunct="1">
-              <a:lnSpc>
-                <a:spcPct val="90000"/>
-              </a:lnSpc>
-              <a:spcBef>
-                <a:spcPct val="0"/>
-              </a:spcBef>
-              <a:buNone/>
-              <a:defRPr sz="3600" kern="1200">
-                <a:solidFill>
-                  <a:schemeClr val="tx1"/>
-                </a:solidFill>
-                <a:latin typeface="+mj-lt"/>
-                <a:ea typeface="+mj-ea"/>
-                <a:cs typeface="+mj-cs"/>
-              </a:defRPr>
-            </a:lvl1pPr>
-          </a:lstStyle>
-          <a:p>
-            <a:r>
-              <a:rPr lang="en-AU" dirty="0" smtClean="0"/>
-              <a:t>What didn’t work...</a:t>
-            </a:r>
+              <a:t>How tasks can be segmented better in the future to accelerate works</a:t>
+            </a:r>
+          </a:p>
+          <a:p>
             <a:endParaRPr lang="en-AU" dirty="0"/>
           </a:p>
         </p:txBody>
@@ -14209,7 +14288,7 @@
     </p:spTree>
     <p:extLst>
       <p:ext uri="{BB962C8B-B14F-4D97-AF65-F5344CB8AC3E}">
-        <p14:creationId xmlns:p14="http://schemas.microsoft.com/office/powerpoint/2010/main" val="2709229914"/>
+        <p14:creationId xmlns:p14="http://schemas.microsoft.com/office/powerpoint/2010/main" val="420205084"/>
       </p:ext>
     </p:extLst>
   </p:cSld>
@@ -14232,7 +14311,7 @@
 </file>
 
 <file path=ppt/slides/slide22.xml><?xml version="1.0" encoding="utf-8"?>
-<p:sld xmlns:a="http://schemas.openxmlformats.org/drawingml/2006/main" xmlns:r="http://schemas.openxmlformats.org/officeDocument/2006/relationships" xmlns:p="http://schemas.openxmlformats.org/presentationml/2006/main">
+<p:sld xmlns:a="http://schemas.openxmlformats.org/drawingml/2006/main" xmlns:r="http://schemas.openxmlformats.org/officeDocument/2006/relationships" xmlns:p="http://schemas.openxmlformats.org/presentationml/2006/main" show="0">
   <p:cSld>
     <p:spTree>
       <p:nvGrpSpPr>
@@ -14253,7 +14332,7 @@
           <p:cNvPr id="2" name="Title 1">
             <a:extLst>
               <a:ext uri="{FF2B5EF4-FFF2-40B4-BE49-F238E27FC236}">
-                <a16:creationId xmlns:a16="http://schemas.microsoft.com/office/drawing/2014/main" xmlns="" id="{118CBBA9-49D2-4262-9114-D0D47E7D522A}"/>
+                <a16:creationId xmlns="" xmlns:a16="http://schemas.microsoft.com/office/drawing/2014/main" id="{118CBBA9-49D2-4262-9114-D0D47E7D522A}"/>
               </a:ext>
             </a:extLst>
           </p:cNvPr>
@@ -14270,10 +14349,9 @@
           <a:lstStyle/>
           <a:p>
             <a:r>
-              <a:rPr lang="en-AU" b="1" dirty="0" smtClean="0"/>
-              <a:t>We learned…</a:t>
-            </a:r>
-            <a:endParaRPr lang="en-AU" dirty="0"/>
+              <a:rPr lang="en-AU" dirty="0"/>
+              <a:t>What worked?</a:t>
+            </a:r>
           </a:p>
         </p:txBody>
       </p:sp>
@@ -14282,7 +14360,7 @@
           <p:cNvPr id="3" name="Content Placeholder 2">
             <a:extLst>
               <a:ext uri="{FF2B5EF4-FFF2-40B4-BE49-F238E27FC236}">
-                <a16:creationId xmlns:a16="http://schemas.microsoft.com/office/drawing/2014/main" xmlns="" id="{1E6F3B36-FA1C-4A44-8799-54720A510D55}"/>
+                <a16:creationId xmlns="" xmlns:a16="http://schemas.microsoft.com/office/drawing/2014/main" id="{1E6F3B36-FA1C-4A44-8799-54720A510D55}"/>
               </a:ext>
             </a:extLst>
           </p:cNvPr>
@@ -14304,30 +14382,39 @@
           <a:lstStyle/>
           <a:p>
             <a:r>
-              <a:rPr lang="en-AU" dirty="0" smtClean="0"/>
-              <a:t>Following the basic fast.ai principles yields generally accurate CV results</a:t>
-            </a:r>
-          </a:p>
-          <a:p>
-            <a:r>
-              <a:rPr lang="en-AU" dirty="0" smtClean="0"/>
-              <a:t>Minimising data augmentation helped</a:t>
-            </a:r>
-          </a:p>
-          <a:p>
-            <a:r>
-              <a:rPr lang="en-AU" dirty="0" smtClean="0"/>
-              <a:t>Randomising the test set and validation set to check yielded model results are not a fluke</a:t>
+              <a:rPr lang="en-AU" dirty="0"/>
+              <a:t>Dropout</a:t>
+            </a:r>
+          </a:p>
+          <a:p>
+            <a:pPr lvl="1"/>
+            <a:r>
+              <a:rPr lang="en-AU" dirty="0"/>
+              <a:t>No dropout results in rapid overfitting – not recommended</a:t>
+            </a:r>
+          </a:p>
+          <a:p>
+            <a:pPr lvl="1"/>
+            <a:r>
+              <a:rPr lang="en-AU" dirty="0"/>
+              <a:t>Default dropout of 25% (first dropout layer) and 50% (second dropout layer) in the </a:t>
+            </a:r>
+            <a:r>
+              <a:rPr lang="en-AU"/>
+              <a:t>resnet34 model worked well</a:t>
             </a:r>
             <a:endParaRPr lang="en-AU" dirty="0"/>
           </a:p>
           <a:p>
-            <a:r>
-              <a:rPr lang="en-AU" dirty="0" smtClean="0"/>
-              <a:t>How tasks can be segmented better in the future to accelerate works</a:t>
-            </a:r>
-          </a:p>
-          <a:p>
+            <a:pPr lvl="1"/>
+            <a:endParaRPr lang="en-AU" dirty="0"/>
+          </a:p>
+          <a:p>
+            <a:pPr lvl="1"/>
+            <a:endParaRPr lang="en-AU" dirty="0"/>
+          </a:p>
+          <a:p>
+            <a:pPr lvl="1"/>
             <a:endParaRPr lang="en-AU" dirty="0"/>
           </a:p>
         </p:txBody>
@@ -14335,7 +14422,7 @@
     </p:spTree>
     <p:extLst>
       <p:ext uri="{BB962C8B-B14F-4D97-AF65-F5344CB8AC3E}">
-        <p14:creationId xmlns:p14="http://schemas.microsoft.com/office/powerpoint/2010/main" val="420205084"/>
+        <p14:creationId xmlns:p14="http://schemas.microsoft.com/office/powerpoint/2010/main" val="2167520984"/>
       </p:ext>
     </p:extLst>
   </p:cSld>
@@ -14376,13 +14463,7 @@
       </p:grpSpPr>
       <p:sp>
         <p:nvSpPr>
-          <p:cNvPr id="2" name="Title 1">
-            <a:extLst>
-              <a:ext uri="{FF2B5EF4-FFF2-40B4-BE49-F238E27FC236}">
-                <a16:creationId xmlns:a16="http://schemas.microsoft.com/office/drawing/2014/main" xmlns="" id="{118CBBA9-49D2-4262-9114-D0D47E7D522A}"/>
-              </a:ext>
-            </a:extLst>
-          </p:cNvPr>
+          <p:cNvPr id="4" name="Title 3"/>
           <p:cNvSpPr>
             <a:spLocks noGrp="1"/>
           </p:cNvSpPr>
@@ -14396,93 +14477,62 @@
           <a:lstStyle/>
           <a:p>
             <a:r>
-              <a:rPr lang="en-AU" dirty="0"/>
-              <a:t>What worked?</a:t>
+              <a:rPr lang="en-US" dirty="0"/>
+              <a:t>Challenge 2</a:t>
             </a:r>
           </a:p>
         </p:txBody>
       </p:sp>
       <p:sp>
         <p:nvSpPr>
-          <p:cNvPr id="3" name="Content Placeholder 2">
-            <a:extLst>
-              <a:ext uri="{FF2B5EF4-FFF2-40B4-BE49-F238E27FC236}">
-                <a16:creationId xmlns:a16="http://schemas.microsoft.com/office/drawing/2014/main" xmlns="" id="{1E6F3B36-FA1C-4A44-8799-54720A510D55}"/>
-              </a:ext>
-            </a:extLst>
-          </p:cNvPr>
+          <p:cNvPr id="5" name="Text Placeholder 4"/>
           <p:cNvSpPr>
             <a:spLocks noGrp="1"/>
           </p:cNvSpPr>
           <p:nvPr>
-            <p:ph idx="1"/>
+            <p:ph type="body" idx="1"/>
           </p:nvPr>
         </p:nvSpPr>
-        <p:spPr>
-          <a:xfrm>
-            <a:off x="1218883" y="1701797"/>
-            <a:ext cx="10564161" cy="4462272"/>
-          </a:xfrm>
-        </p:spPr>
+        <p:spPr/>
         <p:txBody>
-          <a:bodyPr/>
+          <a:bodyPr>
+            <a:normAutofit lnSpcReduction="10000"/>
+          </a:bodyPr>
           <a:lstStyle/>
           <a:p>
             <a:r>
-              <a:rPr lang="en-AU" dirty="0"/>
-              <a:t>Dropout</a:t>
-            </a:r>
-          </a:p>
-          <a:p>
-            <a:pPr lvl="1"/>
-            <a:r>
-              <a:rPr lang="en-AU" dirty="0"/>
-              <a:t>No dropout results in rapid overfitting – not recommended</a:t>
-            </a:r>
-          </a:p>
-          <a:p>
-            <a:pPr lvl="1"/>
-            <a:r>
-              <a:rPr lang="en-AU" dirty="0"/>
-              <a:t>Default dropout of 25% (first dropout layer) and 50% (second dropout layer) in the </a:t>
-            </a:r>
-            <a:r>
-              <a:rPr lang="en-AU"/>
-              <a:t>resnet34 model worked well</a:t>
-            </a:r>
-            <a:endParaRPr lang="en-AU" dirty="0"/>
-          </a:p>
-          <a:p>
-            <a:pPr lvl="1"/>
-            <a:endParaRPr lang="en-AU" dirty="0"/>
-          </a:p>
-          <a:p>
-            <a:pPr lvl="1"/>
-            <a:endParaRPr lang="en-AU" dirty="0"/>
-          </a:p>
-          <a:p>
-            <a:pPr lvl="1"/>
-            <a:endParaRPr lang="en-AU" dirty="0"/>
+              <a:rPr lang="en-US" dirty="0"/>
+              <a:t>Photovoltaic generation</a:t>
+            </a:r>
+          </a:p>
+          <a:p>
+            <a:endParaRPr lang="en-US" dirty="0"/>
+          </a:p>
+          <a:p>
+            <a:r>
+              <a:rPr lang="en-US" dirty="0"/>
+              <a:t>PART B - SIZING</a:t>
+            </a:r>
           </a:p>
         </p:txBody>
       </p:sp>
     </p:spTree>
     <p:extLst>
       <p:ext uri="{BB962C8B-B14F-4D97-AF65-F5344CB8AC3E}">
-        <p14:creationId xmlns:p14="http://schemas.microsoft.com/office/powerpoint/2010/main" val="2167520984"/>
+        <p14:creationId xmlns:p14="http://schemas.microsoft.com/office/powerpoint/2010/main" val="3970823378"/>
       </p:ext>
     </p:extLst>
   </p:cSld>
   <p:clrMapOvr>
     <a:masterClrMapping/>
   </p:clrMapOvr>
-  <mc:AlternateContent xmlns:mc="http://schemas.openxmlformats.org/markup-compatibility/2006">
-    <mc:Choice xmlns:p14="http://schemas.microsoft.com/office/powerpoint/2010/main" Requires="p14">
+  <mc:AlternateContent xmlns:mc="http://schemas.openxmlformats.org/markup-compatibility/2006" xmlns:p14="http://schemas.microsoft.com/office/powerpoint/2010/main">
+    <mc:Choice Requires="p14">
       <p:transition spd="med" p14:dur="700">
         <p:fade/>
       </p:transition>
     </mc:Choice>
-    <mc:Fallback>
+    <mc:Fallback xmlns="">
       <p:transition spd="med">
         <p:fade/>
       </p:transition>
@@ -14510,107 +14560,10 @@
       </p:grpSpPr>
       <p:sp>
         <p:nvSpPr>
-          <p:cNvPr id="4" name="Title 3"/>
-          <p:cNvSpPr>
-            <a:spLocks noGrp="1"/>
-          </p:cNvSpPr>
-          <p:nvPr>
-            <p:ph type="title"/>
-          </p:nvPr>
-        </p:nvSpPr>
-        <p:spPr/>
-        <p:txBody>
-          <a:bodyPr/>
-          <a:lstStyle/>
-          <a:p>
-            <a:r>
-              <a:rPr lang="en-US" dirty="0"/>
-              <a:t>Challenge 2</a:t>
-            </a:r>
-          </a:p>
-        </p:txBody>
-      </p:sp>
-      <p:sp>
-        <p:nvSpPr>
-          <p:cNvPr id="5" name="Text Placeholder 4"/>
-          <p:cNvSpPr>
-            <a:spLocks noGrp="1"/>
-          </p:cNvSpPr>
-          <p:nvPr>
-            <p:ph type="body" idx="1"/>
-          </p:nvPr>
-        </p:nvSpPr>
-        <p:spPr/>
-        <p:txBody>
-          <a:bodyPr>
-            <a:normAutofit lnSpcReduction="10000"/>
-          </a:bodyPr>
-          <a:lstStyle/>
-          <a:p>
-            <a:r>
-              <a:rPr lang="en-US" dirty="0"/>
-              <a:t>Photovoltaic generation</a:t>
-            </a:r>
-          </a:p>
-          <a:p>
-            <a:endParaRPr lang="en-US" dirty="0"/>
-          </a:p>
-          <a:p>
-            <a:r>
-              <a:rPr lang="en-US" dirty="0"/>
-              <a:t>PART B - SIZING</a:t>
-            </a:r>
-          </a:p>
-        </p:txBody>
-      </p:sp>
-    </p:spTree>
-    <p:extLst>
-      <p:ext uri="{BB962C8B-B14F-4D97-AF65-F5344CB8AC3E}">
-        <p14:creationId xmlns:p14="http://schemas.microsoft.com/office/powerpoint/2010/main" val="3970823378"/>
-      </p:ext>
-    </p:extLst>
-  </p:cSld>
-  <p:clrMapOvr>
-    <a:masterClrMapping/>
-  </p:clrMapOvr>
-  <mc:AlternateContent xmlns:mc="http://schemas.openxmlformats.org/markup-compatibility/2006">
-    <mc:Choice xmlns:p14="http://schemas.microsoft.com/office/powerpoint/2010/main" Requires="p14">
-      <p:transition spd="med" p14:dur="700">
-        <p:fade/>
-      </p:transition>
-    </mc:Choice>
-    <mc:Fallback>
-      <p:transition spd="med">
-        <p:fade/>
-      </p:transition>
-    </mc:Fallback>
-  </mc:AlternateContent>
-</p:sld>
-</file>
-
-<file path=ppt/slides/slide25.xml><?xml version="1.0" encoding="utf-8"?>
-<p:sld xmlns:a="http://schemas.openxmlformats.org/drawingml/2006/main" xmlns:r="http://schemas.openxmlformats.org/officeDocument/2006/relationships" xmlns:p="http://schemas.openxmlformats.org/presentationml/2006/main" show="0">
-  <p:cSld>
-    <p:spTree>
-      <p:nvGrpSpPr>
-        <p:cNvPr id="1" name=""/>
-        <p:cNvGrpSpPr/>
-        <p:nvPr/>
-      </p:nvGrpSpPr>
-      <p:grpSpPr>
-        <a:xfrm>
-          <a:off x="0" y="0"/>
-          <a:ext cx="0" cy="0"/>
-          <a:chOff x="0" y="0"/>
-          <a:chExt cx="0" cy="0"/>
-        </a:xfrm>
-      </p:grpSpPr>
-      <p:sp>
-        <p:nvSpPr>
           <p:cNvPr id="2" name="Title 1">
             <a:extLst>
               <a:ext uri="{FF2B5EF4-FFF2-40B4-BE49-F238E27FC236}">
-                <a16:creationId xmlns:a16="http://schemas.microsoft.com/office/drawing/2014/main" xmlns="" id="{118CBBA9-49D2-4262-9114-D0D47E7D522A}"/>
+                <a16:creationId xmlns="" xmlns:a16="http://schemas.microsoft.com/office/drawing/2014/main" id="{118CBBA9-49D2-4262-9114-D0D47E7D522A}"/>
               </a:ext>
             </a:extLst>
           </p:cNvPr>
@@ -14638,7 +14591,7 @@
           <p:cNvPr id="3" name="Content Placeholder 2">
             <a:extLst>
               <a:ext uri="{FF2B5EF4-FFF2-40B4-BE49-F238E27FC236}">
-                <a16:creationId xmlns:a16="http://schemas.microsoft.com/office/drawing/2014/main" xmlns="" id="{1E6F3B36-FA1C-4A44-8799-54720A510D55}"/>
+                <a16:creationId xmlns="" xmlns:a16="http://schemas.microsoft.com/office/drawing/2014/main" id="{1E6F3B36-FA1C-4A44-8799-54720A510D55}"/>
               </a:ext>
             </a:extLst>
           </p:cNvPr>
@@ -14697,13 +14650,13 @@
   <p:clrMapOvr>
     <a:masterClrMapping/>
   </p:clrMapOvr>
-  <mc:AlternateContent xmlns:mc="http://schemas.openxmlformats.org/markup-compatibility/2006">
-    <mc:Choice xmlns:p14="http://schemas.microsoft.com/office/powerpoint/2010/main" Requires="p14">
+  <mc:AlternateContent xmlns:mc="http://schemas.openxmlformats.org/markup-compatibility/2006" xmlns:p14="http://schemas.microsoft.com/office/powerpoint/2010/main">
+    <mc:Choice Requires="p14">
       <p:transition spd="med" p14:dur="700">
         <p:fade/>
       </p:transition>
     </mc:Choice>
-    <mc:Fallback>
+    <mc:Fallback xmlns="">
       <p:transition spd="med">
         <p:fade/>
       </p:transition>
@@ -14712,7 +14665,7 @@
 </p:sld>
 </file>
 
-<file path=ppt/slides/slide26.xml><?xml version="1.0" encoding="utf-8"?>
+<file path=ppt/slides/slide25.xml><?xml version="1.0" encoding="utf-8"?>
 <p:sld xmlns:a="http://schemas.openxmlformats.org/drawingml/2006/main" xmlns:r="http://schemas.openxmlformats.org/officeDocument/2006/relationships" xmlns:p="http://schemas.openxmlformats.org/presentationml/2006/main">
   <p:cSld>
     <p:spTree>
@@ -14734,7 +14687,7 @@
           <p:cNvPr id="2" name="Title 1">
             <a:extLst>
               <a:ext uri="{FF2B5EF4-FFF2-40B4-BE49-F238E27FC236}">
-                <a16:creationId xmlns:a16="http://schemas.microsoft.com/office/drawing/2014/main" xmlns="" id="{118CBBA9-49D2-4262-9114-D0D47E7D522A}"/>
+                <a16:creationId xmlns="" xmlns:a16="http://schemas.microsoft.com/office/drawing/2014/main" id="{118CBBA9-49D2-4262-9114-D0D47E7D522A}"/>
               </a:ext>
             </a:extLst>
           </p:cNvPr>
@@ -14767,7 +14720,7 @@
           <p:cNvPr id="3" name="Content Placeholder 2">
             <a:extLst>
               <a:ext uri="{FF2B5EF4-FFF2-40B4-BE49-F238E27FC236}">
-                <a16:creationId xmlns:a16="http://schemas.microsoft.com/office/drawing/2014/main" xmlns="" id="{1E6F3B36-FA1C-4A44-8799-54720A510D55}"/>
+                <a16:creationId xmlns="" xmlns:a16="http://schemas.microsoft.com/office/drawing/2014/main" id="{1E6F3B36-FA1C-4A44-8799-54720A510D55}"/>
               </a:ext>
             </a:extLst>
           </p:cNvPr>
@@ -14814,7 +14767,7 @@
           <p:cNvPr id="5" name="Picture 4">
             <a:extLst>
               <a:ext uri="{FF2B5EF4-FFF2-40B4-BE49-F238E27FC236}">
-                <a16:creationId xmlns:a16="http://schemas.microsoft.com/office/drawing/2014/main" xmlns="" id="{4E9B1E06-FE9D-462D-A33F-A672B189115A}"/>
+                <a16:creationId xmlns="" xmlns:a16="http://schemas.microsoft.com/office/drawing/2014/main" id="{4E9B1E06-FE9D-462D-A33F-A672B189115A}"/>
               </a:ext>
             </a:extLst>
           </p:cNvPr>
@@ -14850,7 +14803,7 @@
           <p:cNvPr id="6" name="Picture 5">
             <a:extLst>
               <a:ext uri="{FF2B5EF4-FFF2-40B4-BE49-F238E27FC236}">
-                <a16:creationId xmlns:a16="http://schemas.microsoft.com/office/drawing/2014/main" xmlns="" id="{EEFF4B65-FE70-4058-AB79-864721B760FD}"/>
+                <a16:creationId xmlns="" xmlns:a16="http://schemas.microsoft.com/office/drawing/2014/main" id="{EEFF4B65-FE70-4058-AB79-864721B760FD}"/>
               </a:ext>
             </a:extLst>
           </p:cNvPr>
@@ -16282,7 +16235,7 @@
       </p:grpSpPr>
       <p:sp>
         <p:nvSpPr>
-          <p:cNvPr id="13" name="Title 12"/>
+          <p:cNvPr id="4" name="Title 3"/>
           <p:cNvSpPr>
             <a:spLocks noGrp="1"/>
           </p:cNvSpPr>
@@ -16297,29 +16250,40 @@
           <a:p>
             <a:r>
               <a:rPr lang="en-US" dirty="0"/>
-              <a:t>Overview</a:t>
+              <a:t>Challenge 2</a:t>
             </a:r>
           </a:p>
         </p:txBody>
       </p:sp>
       <p:sp>
         <p:nvSpPr>
-          <p:cNvPr id="14" name="Content Placeholder 13"/>
+          <p:cNvPr id="5" name="Text Placeholder 4"/>
           <p:cNvSpPr>
             <a:spLocks noGrp="1"/>
           </p:cNvSpPr>
           <p:nvPr>
-            <p:ph idx="1"/>
+            <p:ph type="body" idx="1"/>
           </p:nvPr>
         </p:nvSpPr>
         <p:spPr/>
         <p:txBody>
-          <a:bodyPr/>
+          <a:bodyPr>
+            <a:normAutofit lnSpcReduction="10000"/>
+          </a:bodyPr>
           <a:lstStyle/>
           <a:p>
             <a:r>
               <a:rPr lang="en-US" dirty="0"/>
-              <a:t>To do</a:t>
+              <a:t>Photovoltaic generation</a:t>
+            </a:r>
+          </a:p>
+          <a:p>
+            <a:endParaRPr lang="en-US" dirty="0"/>
+          </a:p>
+          <a:p>
+            <a:r>
+              <a:rPr lang="en-US" dirty="0"/>
+              <a:t>PART A - Detection</a:t>
             </a:r>
           </a:p>
         </p:txBody>
@@ -16327,7 +16291,7 @@
     </p:spTree>
     <p:extLst>
       <p:ext uri="{BB962C8B-B14F-4D97-AF65-F5344CB8AC3E}">
-        <p14:creationId xmlns:p14="http://schemas.microsoft.com/office/powerpoint/2010/main" val="820411689"/>
+        <p14:creationId xmlns:p14="http://schemas.microsoft.com/office/powerpoint/2010/main" val="4264977537"/>
       </p:ext>
     </p:extLst>
   </p:cSld>
@@ -17300,142 +17264,6 @@
 </file>
 
 <file path=customXml/item1.xml><?xml version="1.0" encoding="utf-8"?>
-<p:properties xmlns:p="http://schemas.microsoft.com/office/2006/metadata/properties" xmlns:xsi="http://www.w3.org/2001/XMLSchema-instance" xmlns:pc="http://schemas.microsoft.com/office/infopath/2007/PartnerControls">
-  <documentManagement>
-    <LocPublishedLinkedAssetsLookup xmlns="4873beb7-5857-4685-be1f-d57550cc96cc" xsi:nil="true"/>
-    <ApprovalStatus xmlns="4873beb7-5857-4685-be1f-d57550cc96cc">InProgress</ApprovalStatus>
-    <MarketSpecific xmlns="4873beb7-5857-4685-be1f-d57550cc96cc">false</MarketSpecific>
-    <LocComments xmlns="4873beb7-5857-4685-be1f-d57550cc96cc" xsi:nil="true"/>
-    <LocLastLocAttemptVersionTypeLookup xmlns="4873beb7-5857-4685-be1f-d57550cc96cc" xsi:nil="true"/>
-    <DirectSourceMarket xmlns="4873beb7-5857-4685-be1f-d57550cc96cc" xsi:nil="true"/>
-    <ThumbnailAssetId xmlns="4873beb7-5857-4685-be1f-d57550cc96cc" xsi:nil="true"/>
-    <PrimaryImageGen xmlns="4873beb7-5857-4685-be1f-d57550cc96cc">false</PrimaryImageGen>
-    <LocNewPublishedVersionLookup xmlns="4873beb7-5857-4685-be1f-d57550cc96cc" xsi:nil="true"/>
-    <LegacyData xmlns="4873beb7-5857-4685-be1f-d57550cc96cc" xsi:nil="true"/>
-    <LocRecommendedHandoff xmlns="4873beb7-5857-4685-be1f-d57550cc96cc" xsi:nil="true"/>
-    <BusinessGroup xmlns="4873beb7-5857-4685-be1f-d57550cc96cc" xsi:nil="true"/>
-    <BlockPublish xmlns="4873beb7-5857-4685-be1f-d57550cc96cc">false</BlockPublish>
-    <TPFriendlyName xmlns="4873beb7-5857-4685-be1f-d57550cc96cc" xsi:nil="true"/>
-    <LocOverallPublishStatusLookup xmlns="4873beb7-5857-4685-be1f-d57550cc96cc" xsi:nil="true"/>
-    <NumericId xmlns="4873beb7-5857-4685-be1f-d57550cc96cc" xsi:nil="true"/>
-    <APEditor xmlns="4873beb7-5857-4685-be1f-d57550cc96cc">
-      <UserInfo>
-        <DisplayName/>
-        <AccountId xsi:nil="true"/>
-        <AccountType/>
-      </UserInfo>
-    </APEditor>
-    <SourceTitle xmlns="4873beb7-5857-4685-be1f-d57550cc96cc" xsi:nil="true"/>
-    <OpenTemplate xmlns="4873beb7-5857-4685-be1f-d57550cc96cc">true</OpenTemplate>
-    <LocOverallLocStatusLookup xmlns="4873beb7-5857-4685-be1f-d57550cc96cc" xsi:nil="true"/>
-    <UALocComments xmlns="4873beb7-5857-4685-be1f-d57550cc96cc" xsi:nil="true"/>
-    <ParentAssetId xmlns="4873beb7-5857-4685-be1f-d57550cc96cc" xsi:nil="true"/>
-    <IntlLangReviewDate xmlns="4873beb7-5857-4685-be1f-d57550cc96cc" xsi:nil="true"/>
-    <FeatureTagsTaxHTField0 xmlns="4873beb7-5857-4685-be1f-d57550cc96cc">
-      <Terms xmlns="http://schemas.microsoft.com/office/infopath/2007/PartnerControls"/>
-    </FeatureTagsTaxHTField0>
-    <PublishStatusLookup xmlns="4873beb7-5857-4685-be1f-d57550cc96cc">
-      <Value>1345093</Value>
-    </PublishStatusLookup>
-    <Providers xmlns="4873beb7-5857-4685-be1f-d57550cc96cc" xsi:nil="true"/>
-    <MachineTranslated xmlns="4873beb7-5857-4685-be1f-d57550cc96cc">false</MachineTranslated>
-    <OriginalSourceMarket xmlns="4873beb7-5857-4685-be1f-d57550cc96cc" xsi:nil="true"/>
-    <APDescription xmlns="4873beb7-5857-4685-be1f-d57550cc96cc">This simple template design works for technology and  businesses, but it's versatile enough to use in other contexts.  It features multiple slide layouts designed for widescreen (16x9 resolution) and includes a sample SmartArt list and chart that are easily editable.</APDescription>
-    <ClipArtFilename xmlns="4873beb7-5857-4685-be1f-d57550cc96cc" xsi:nil="true"/>
-    <ContentItem xmlns="4873beb7-5857-4685-be1f-d57550cc96cc" xsi:nil="true"/>
-    <TPInstallLocation xmlns="4873beb7-5857-4685-be1f-d57550cc96cc" xsi:nil="true"/>
-    <PublishTargets xmlns="4873beb7-5857-4685-be1f-d57550cc96cc">OfficeOnlineVNext</PublishTargets>
-    <TimesCloned xmlns="4873beb7-5857-4685-be1f-d57550cc96cc" xsi:nil="true"/>
-    <AssetStart xmlns="4873beb7-5857-4685-be1f-d57550cc96cc">2011-11-26T00:30:00+00:00</AssetStart>
-    <Provider xmlns="4873beb7-5857-4685-be1f-d57550cc96cc" xsi:nil="true"/>
-    <AcquiredFrom xmlns="4873beb7-5857-4685-be1f-d57550cc96cc">Internal MS</AcquiredFrom>
-    <FriendlyTitle xmlns="4873beb7-5857-4685-be1f-d57550cc96cc" xsi:nil="true"/>
-    <LastHandOff xmlns="4873beb7-5857-4685-be1f-d57550cc96cc" xsi:nil="true"/>
-    <TPClientViewer xmlns="4873beb7-5857-4685-be1f-d57550cc96cc" xsi:nil="true"/>
-    <TemplateStatus xmlns="4873beb7-5857-4685-be1f-d57550cc96cc">Complete</TemplateStatus>
-    <Downloads xmlns="4873beb7-5857-4685-be1f-d57550cc96cc">0</Downloads>
-    <OOCacheId xmlns="4873beb7-5857-4685-be1f-d57550cc96cc" xsi:nil="true"/>
-    <IsDeleted xmlns="4873beb7-5857-4685-be1f-d57550cc96cc">false</IsDeleted>
-    <LocPublishedDependentAssetsLookup xmlns="4873beb7-5857-4685-be1f-d57550cc96cc" xsi:nil="true"/>
-    <TPExecutable xmlns="4873beb7-5857-4685-be1f-d57550cc96cc" xsi:nil="true"/>
-    <EditorialTags xmlns="4873beb7-5857-4685-be1f-d57550cc96cc" xsi:nil="true"/>
-    <SubmitterId xmlns="4873beb7-5857-4685-be1f-d57550cc96cc" xsi:nil="true"/>
-    <ApprovalLog xmlns="4873beb7-5857-4685-be1f-d57550cc96cc" xsi:nil="true"/>
-    <AssetType xmlns="4873beb7-5857-4685-be1f-d57550cc96cc">TP</AssetType>
-    <BugNumber xmlns="4873beb7-5857-4685-be1f-d57550cc96cc" xsi:nil="true"/>
-    <CSXSubmissionDate xmlns="4873beb7-5857-4685-be1f-d57550cc96cc" xsi:nil="true"/>
-    <CSXUpdate xmlns="4873beb7-5857-4685-be1f-d57550cc96cc">false</CSXUpdate>
-    <Milestone xmlns="4873beb7-5857-4685-be1f-d57550cc96cc" xsi:nil="true"/>
-    <RecommendationsModifier xmlns="4873beb7-5857-4685-be1f-d57550cc96cc" xsi:nil="true"/>
-    <OriginAsset xmlns="4873beb7-5857-4685-be1f-d57550cc96cc" xsi:nil="true"/>
-    <TPComponent xmlns="4873beb7-5857-4685-be1f-d57550cc96cc" xsi:nil="true"/>
-    <AssetId xmlns="4873beb7-5857-4685-be1f-d57550cc96cc">TP102787989</AssetId>
-    <IntlLocPriority xmlns="4873beb7-5857-4685-be1f-d57550cc96cc" xsi:nil="true"/>
-    <PolicheckWords xmlns="4873beb7-5857-4685-be1f-d57550cc96cc" xsi:nil="true"/>
-    <TPLaunchHelpLink xmlns="4873beb7-5857-4685-be1f-d57550cc96cc" xsi:nil="true"/>
-    <TPApplication xmlns="4873beb7-5857-4685-be1f-d57550cc96cc" xsi:nil="true"/>
-    <CrawlForDependencies xmlns="4873beb7-5857-4685-be1f-d57550cc96cc">false</CrawlForDependencies>
-    <HandoffToMSDN xmlns="4873beb7-5857-4685-be1f-d57550cc96cc" xsi:nil="true"/>
-    <PlannedPubDate xmlns="4873beb7-5857-4685-be1f-d57550cc96cc" xsi:nil="true"/>
-    <IntlLangReviewer xmlns="4873beb7-5857-4685-be1f-d57550cc96cc" xsi:nil="true"/>
-    <TrustLevel xmlns="4873beb7-5857-4685-be1f-d57550cc96cc">1 Microsoft Managed Content</TrustLevel>
-    <LocLastLocAttemptVersionLookup xmlns="4873beb7-5857-4685-be1f-d57550cc96cc">694266</LocLastLocAttemptVersionLookup>
-    <LocProcessedForHandoffsLookup xmlns="4873beb7-5857-4685-be1f-d57550cc96cc" xsi:nil="true"/>
-    <IsSearchable xmlns="4873beb7-5857-4685-be1f-d57550cc96cc">true</IsSearchable>
-    <TemplateTemplateType xmlns="4873beb7-5857-4685-be1f-d57550cc96cc">PowerPoint Presentation Template</TemplateTemplateType>
-    <CampaignTagsTaxHTField0 xmlns="4873beb7-5857-4685-be1f-d57550cc96cc">
-      <Terms xmlns="http://schemas.microsoft.com/office/infopath/2007/PartnerControls"/>
-    </CampaignTagsTaxHTField0>
-    <TPNamespace xmlns="4873beb7-5857-4685-be1f-d57550cc96cc" xsi:nil="true"/>
-    <LocOverallPreviewStatusLookup xmlns="4873beb7-5857-4685-be1f-d57550cc96cc" xsi:nil="true"/>
-    <TaxCatchAll xmlns="4873beb7-5857-4685-be1f-d57550cc96cc"/>
-    <Markets xmlns="4873beb7-5857-4685-be1f-d57550cc96cc"/>
-    <UAProjectedTotalWords xmlns="4873beb7-5857-4685-be1f-d57550cc96cc" xsi:nil="true"/>
-    <IntlLangReview xmlns="4873beb7-5857-4685-be1f-d57550cc96cc" xsi:nil="true"/>
-    <OutputCachingOn xmlns="4873beb7-5857-4685-be1f-d57550cc96cc">false</OutputCachingOn>
-    <AverageRating xmlns="4873beb7-5857-4685-be1f-d57550cc96cc" xsi:nil="true"/>
-    <APAuthor xmlns="4873beb7-5857-4685-be1f-d57550cc96cc">
-      <UserInfo>
-        <DisplayName>REDMOND\kristaa</DisplayName>
-        <AccountId>136</AccountId>
-        <AccountType/>
-      </UserInfo>
-    </APAuthor>
-    <LocManualTestRequired xmlns="4873beb7-5857-4685-be1f-d57550cc96cc">false</LocManualTestRequired>
-    <TPCommandLine xmlns="4873beb7-5857-4685-be1f-d57550cc96cc" xsi:nil="true"/>
-    <TPAppVersion xmlns="4873beb7-5857-4685-be1f-d57550cc96cc" xsi:nil="true"/>
-    <EditorialStatus xmlns="4873beb7-5857-4685-be1f-d57550cc96cc">Complete</EditorialStatus>
-    <LastModifiedDateTime xmlns="4873beb7-5857-4685-be1f-d57550cc96cc" xsi:nil="true"/>
-    <ScenarioTagsTaxHTField0 xmlns="4873beb7-5857-4685-be1f-d57550cc96cc">
-      <Terms xmlns="http://schemas.microsoft.com/office/infopath/2007/PartnerControls"/>
-    </ScenarioTagsTaxHTField0>
-    <LocProcessedForMarketsLookup xmlns="4873beb7-5857-4685-be1f-d57550cc96cc" xsi:nil="true"/>
-    <TPLaunchHelpLinkType xmlns="4873beb7-5857-4685-be1f-d57550cc96cc">Template</TPLaunchHelpLinkType>
-    <OriginalRelease xmlns="4873beb7-5857-4685-be1f-d57550cc96cc">15</OriginalRelease>
-    <LocalizationTagsTaxHTField0 xmlns="4873beb7-5857-4685-be1f-d57550cc96cc">
-      <Terms xmlns="http://schemas.microsoft.com/office/infopath/2007/PartnerControls"/>
-    </LocalizationTagsTaxHTField0>
-    <UACurrentWords xmlns="4873beb7-5857-4685-be1f-d57550cc96cc" xsi:nil="true"/>
-    <ArtSampleDocs xmlns="4873beb7-5857-4685-be1f-d57550cc96cc" xsi:nil="true"/>
-    <UALocRecommendation xmlns="4873beb7-5857-4685-be1f-d57550cc96cc">Localize</UALocRecommendation>
-    <Manager xmlns="4873beb7-5857-4685-be1f-d57550cc96cc" xsi:nil="true"/>
-    <LocOverallHandbackStatusLookup xmlns="4873beb7-5857-4685-be1f-d57550cc96cc" xsi:nil="true"/>
-    <ShowIn xmlns="4873beb7-5857-4685-be1f-d57550cc96cc">Show everywhere</ShowIn>
-    <UANotes xmlns="4873beb7-5857-4685-be1f-d57550cc96cc" xsi:nil="true"/>
-    <InternalTagsTaxHTField0 xmlns="4873beb7-5857-4685-be1f-d57550cc96cc">
-      <Terms xmlns="http://schemas.microsoft.com/office/infopath/2007/PartnerControls"/>
-    </InternalTagsTaxHTField0>
-    <CSXHash xmlns="4873beb7-5857-4685-be1f-d57550cc96cc" xsi:nil="true"/>
-    <VoteCount xmlns="4873beb7-5857-4685-be1f-d57550cc96cc" xsi:nil="true"/>
-    <AssetExpire xmlns="4873beb7-5857-4685-be1f-d57550cc96cc">2029-05-12T07:00:00+00:00</AssetExpire>
-    <DSATActionTaken xmlns="4873beb7-5857-4685-be1f-d57550cc96cc" xsi:nil="true"/>
-    <CSXSubmissionMarket xmlns="4873beb7-5857-4685-be1f-d57550cc96cc" xsi:nil="true"/>
-    <LocMarketGroupTiers2 xmlns="4873beb7-5857-4685-be1f-d57550cc96cc" xsi:nil="true"/>
-  </documentManagement>
-</p:properties>
-</file>
-
-<file path=customXml/item2.xml><?xml version="1.0" encoding="utf-8"?>
 <ct:contentTypeSchema xmlns:ct="http://schemas.microsoft.com/office/2006/metadata/contentType" xmlns:ma="http://schemas.microsoft.com/office/2006/metadata/properties/metaAttributes" ct:_="" ma:_="" ma:contentTypeName="TemplateFile" ma:contentTypeID="0x0101006EDDDB5EE6D98C44930B742096920B300400F5B6D36B3EF94B4E9A635CDF2A18F5B8" ma:contentTypeVersion="72" ma:contentTypeDescription="Create a new document." ma:contentTypeScope="" ma:versionID="a23e56308344d904b51738559c3d67c9">
   <xsd:schema xmlns:xsd="http://www.w3.org/2001/XMLSchema" xmlns:xs="http://www.w3.org/2001/XMLSchema" xmlns:p="http://schemas.microsoft.com/office/2006/metadata/properties" xmlns:ns2="4873beb7-5857-4685-be1f-d57550cc96cc" targetNamespace="http://schemas.microsoft.com/office/2006/metadata/properties" ma:root="true" ma:fieldsID="cd0908cc4600e77bf5da051303e00c8d" ns2:_="">
     <xsd:import namespace="4873beb7-5857-4685-be1f-d57550cc96cc"/>
@@ -18475,6 +18303,142 @@
 </ct:contentTypeSchema>
 </file>
 
+<file path=customXml/item2.xml><?xml version="1.0" encoding="utf-8"?>
+<p:properties xmlns:p="http://schemas.microsoft.com/office/2006/metadata/properties" xmlns:xsi="http://www.w3.org/2001/XMLSchema-instance" xmlns:pc="http://schemas.microsoft.com/office/infopath/2007/PartnerControls">
+  <documentManagement>
+    <LocPublishedLinkedAssetsLookup xmlns="4873beb7-5857-4685-be1f-d57550cc96cc" xsi:nil="true"/>
+    <ApprovalStatus xmlns="4873beb7-5857-4685-be1f-d57550cc96cc">InProgress</ApprovalStatus>
+    <MarketSpecific xmlns="4873beb7-5857-4685-be1f-d57550cc96cc">false</MarketSpecific>
+    <LocComments xmlns="4873beb7-5857-4685-be1f-d57550cc96cc" xsi:nil="true"/>
+    <LocLastLocAttemptVersionTypeLookup xmlns="4873beb7-5857-4685-be1f-d57550cc96cc" xsi:nil="true"/>
+    <DirectSourceMarket xmlns="4873beb7-5857-4685-be1f-d57550cc96cc" xsi:nil="true"/>
+    <ThumbnailAssetId xmlns="4873beb7-5857-4685-be1f-d57550cc96cc" xsi:nil="true"/>
+    <PrimaryImageGen xmlns="4873beb7-5857-4685-be1f-d57550cc96cc">false</PrimaryImageGen>
+    <LocNewPublishedVersionLookup xmlns="4873beb7-5857-4685-be1f-d57550cc96cc" xsi:nil="true"/>
+    <LegacyData xmlns="4873beb7-5857-4685-be1f-d57550cc96cc" xsi:nil="true"/>
+    <LocRecommendedHandoff xmlns="4873beb7-5857-4685-be1f-d57550cc96cc" xsi:nil="true"/>
+    <BusinessGroup xmlns="4873beb7-5857-4685-be1f-d57550cc96cc" xsi:nil="true"/>
+    <BlockPublish xmlns="4873beb7-5857-4685-be1f-d57550cc96cc">false</BlockPublish>
+    <TPFriendlyName xmlns="4873beb7-5857-4685-be1f-d57550cc96cc" xsi:nil="true"/>
+    <LocOverallPublishStatusLookup xmlns="4873beb7-5857-4685-be1f-d57550cc96cc" xsi:nil="true"/>
+    <NumericId xmlns="4873beb7-5857-4685-be1f-d57550cc96cc" xsi:nil="true"/>
+    <APEditor xmlns="4873beb7-5857-4685-be1f-d57550cc96cc">
+      <UserInfo>
+        <DisplayName/>
+        <AccountId xsi:nil="true"/>
+        <AccountType/>
+      </UserInfo>
+    </APEditor>
+    <SourceTitle xmlns="4873beb7-5857-4685-be1f-d57550cc96cc" xsi:nil="true"/>
+    <OpenTemplate xmlns="4873beb7-5857-4685-be1f-d57550cc96cc">true</OpenTemplate>
+    <LocOverallLocStatusLookup xmlns="4873beb7-5857-4685-be1f-d57550cc96cc" xsi:nil="true"/>
+    <UALocComments xmlns="4873beb7-5857-4685-be1f-d57550cc96cc" xsi:nil="true"/>
+    <ParentAssetId xmlns="4873beb7-5857-4685-be1f-d57550cc96cc" xsi:nil="true"/>
+    <IntlLangReviewDate xmlns="4873beb7-5857-4685-be1f-d57550cc96cc" xsi:nil="true"/>
+    <FeatureTagsTaxHTField0 xmlns="4873beb7-5857-4685-be1f-d57550cc96cc">
+      <Terms xmlns="http://schemas.microsoft.com/office/infopath/2007/PartnerControls"/>
+    </FeatureTagsTaxHTField0>
+    <PublishStatusLookup xmlns="4873beb7-5857-4685-be1f-d57550cc96cc">
+      <Value>1345093</Value>
+    </PublishStatusLookup>
+    <Providers xmlns="4873beb7-5857-4685-be1f-d57550cc96cc" xsi:nil="true"/>
+    <MachineTranslated xmlns="4873beb7-5857-4685-be1f-d57550cc96cc">false</MachineTranslated>
+    <OriginalSourceMarket xmlns="4873beb7-5857-4685-be1f-d57550cc96cc" xsi:nil="true"/>
+    <APDescription xmlns="4873beb7-5857-4685-be1f-d57550cc96cc">This simple template design works for technology and  businesses, but it's versatile enough to use in other contexts.  It features multiple slide layouts designed for widescreen (16x9 resolution) and includes a sample SmartArt list and chart that are easily editable.</APDescription>
+    <ClipArtFilename xmlns="4873beb7-5857-4685-be1f-d57550cc96cc" xsi:nil="true"/>
+    <ContentItem xmlns="4873beb7-5857-4685-be1f-d57550cc96cc" xsi:nil="true"/>
+    <TPInstallLocation xmlns="4873beb7-5857-4685-be1f-d57550cc96cc" xsi:nil="true"/>
+    <PublishTargets xmlns="4873beb7-5857-4685-be1f-d57550cc96cc">OfficeOnlineVNext</PublishTargets>
+    <TimesCloned xmlns="4873beb7-5857-4685-be1f-d57550cc96cc" xsi:nil="true"/>
+    <AssetStart xmlns="4873beb7-5857-4685-be1f-d57550cc96cc">2011-11-26T00:30:00+00:00</AssetStart>
+    <Provider xmlns="4873beb7-5857-4685-be1f-d57550cc96cc" xsi:nil="true"/>
+    <AcquiredFrom xmlns="4873beb7-5857-4685-be1f-d57550cc96cc">Internal MS</AcquiredFrom>
+    <FriendlyTitle xmlns="4873beb7-5857-4685-be1f-d57550cc96cc" xsi:nil="true"/>
+    <LastHandOff xmlns="4873beb7-5857-4685-be1f-d57550cc96cc" xsi:nil="true"/>
+    <TPClientViewer xmlns="4873beb7-5857-4685-be1f-d57550cc96cc" xsi:nil="true"/>
+    <TemplateStatus xmlns="4873beb7-5857-4685-be1f-d57550cc96cc">Complete</TemplateStatus>
+    <Downloads xmlns="4873beb7-5857-4685-be1f-d57550cc96cc">0</Downloads>
+    <OOCacheId xmlns="4873beb7-5857-4685-be1f-d57550cc96cc" xsi:nil="true"/>
+    <IsDeleted xmlns="4873beb7-5857-4685-be1f-d57550cc96cc">false</IsDeleted>
+    <LocPublishedDependentAssetsLookup xmlns="4873beb7-5857-4685-be1f-d57550cc96cc" xsi:nil="true"/>
+    <TPExecutable xmlns="4873beb7-5857-4685-be1f-d57550cc96cc" xsi:nil="true"/>
+    <EditorialTags xmlns="4873beb7-5857-4685-be1f-d57550cc96cc" xsi:nil="true"/>
+    <SubmitterId xmlns="4873beb7-5857-4685-be1f-d57550cc96cc" xsi:nil="true"/>
+    <ApprovalLog xmlns="4873beb7-5857-4685-be1f-d57550cc96cc" xsi:nil="true"/>
+    <AssetType xmlns="4873beb7-5857-4685-be1f-d57550cc96cc">TP</AssetType>
+    <BugNumber xmlns="4873beb7-5857-4685-be1f-d57550cc96cc" xsi:nil="true"/>
+    <CSXSubmissionDate xmlns="4873beb7-5857-4685-be1f-d57550cc96cc" xsi:nil="true"/>
+    <CSXUpdate xmlns="4873beb7-5857-4685-be1f-d57550cc96cc">false</CSXUpdate>
+    <Milestone xmlns="4873beb7-5857-4685-be1f-d57550cc96cc" xsi:nil="true"/>
+    <RecommendationsModifier xmlns="4873beb7-5857-4685-be1f-d57550cc96cc" xsi:nil="true"/>
+    <OriginAsset xmlns="4873beb7-5857-4685-be1f-d57550cc96cc" xsi:nil="true"/>
+    <TPComponent xmlns="4873beb7-5857-4685-be1f-d57550cc96cc" xsi:nil="true"/>
+    <AssetId xmlns="4873beb7-5857-4685-be1f-d57550cc96cc">TP102787989</AssetId>
+    <IntlLocPriority xmlns="4873beb7-5857-4685-be1f-d57550cc96cc" xsi:nil="true"/>
+    <PolicheckWords xmlns="4873beb7-5857-4685-be1f-d57550cc96cc" xsi:nil="true"/>
+    <TPLaunchHelpLink xmlns="4873beb7-5857-4685-be1f-d57550cc96cc" xsi:nil="true"/>
+    <TPApplication xmlns="4873beb7-5857-4685-be1f-d57550cc96cc" xsi:nil="true"/>
+    <CrawlForDependencies xmlns="4873beb7-5857-4685-be1f-d57550cc96cc">false</CrawlForDependencies>
+    <HandoffToMSDN xmlns="4873beb7-5857-4685-be1f-d57550cc96cc" xsi:nil="true"/>
+    <PlannedPubDate xmlns="4873beb7-5857-4685-be1f-d57550cc96cc" xsi:nil="true"/>
+    <IntlLangReviewer xmlns="4873beb7-5857-4685-be1f-d57550cc96cc" xsi:nil="true"/>
+    <TrustLevel xmlns="4873beb7-5857-4685-be1f-d57550cc96cc">1 Microsoft Managed Content</TrustLevel>
+    <LocLastLocAttemptVersionLookup xmlns="4873beb7-5857-4685-be1f-d57550cc96cc">694266</LocLastLocAttemptVersionLookup>
+    <LocProcessedForHandoffsLookup xmlns="4873beb7-5857-4685-be1f-d57550cc96cc" xsi:nil="true"/>
+    <IsSearchable xmlns="4873beb7-5857-4685-be1f-d57550cc96cc">true</IsSearchable>
+    <TemplateTemplateType xmlns="4873beb7-5857-4685-be1f-d57550cc96cc">PowerPoint Presentation Template</TemplateTemplateType>
+    <CampaignTagsTaxHTField0 xmlns="4873beb7-5857-4685-be1f-d57550cc96cc">
+      <Terms xmlns="http://schemas.microsoft.com/office/infopath/2007/PartnerControls"/>
+    </CampaignTagsTaxHTField0>
+    <TPNamespace xmlns="4873beb7-5857-4685-be1f-d57550cc96cc" xsi:nil="true"/>
+    <LocOverallPreviewStatusLookup xmlns="4873beb7-5857-4685-be1f-d57550cc96cc" xsi:nil="true"/>
+    <TaxCatchAll xmlns="4873beb7-5857-4685-be1f-d57550cc96cc"/>
+    <Markets xmlns="4873beb7-5857-4685-be1f-d57550cc96cc"/>
+    <UAProjectedTotalWords xmlns="4873beb7-5857-4685-be1f-d57550cc96cc" xsi:nil="true"/>
+    <IntlLangReview xmlns="4873beb7-5857-4685-be1f-d57550cc96cc" xsi:nil="true"/>
+    <OutputCachingOn xmlns="4873beb7-5857-4685-be1f-d57550cc96cc">false</OutputCachingOn>
+    <AverageRating xmlns="4873beb7-5857-4685-be1f-d57550cc96cc" xsi:nil="true"/>
+    <APAuthor xmlns="4873beb7-5857-4685-be1f-d57550cc96cc">
+      <UserInfo>
+        <DisplayName>REDMOND\kristaa</DisplayName>
+        <AccountId>136</AccountId>
+        <AccountType/>
+      </UserInfo>
+    </APAuthor>
+    <LocManualTestRequired xmlns="4873beb7-5857-4685-be1f-d57550cc96cc">false</LocManualTestRequired>
+    <TPCommandLine xmlns="4873beb7-5857-4685-be1f-d57550cc96cc" xsi:nil="true"/>
+    <TPAppVersion xmlns="4873beb7-5857-4685-be1f-d57550cc96cc" xsi:nil="true"/>
+    <EditorialStatus xmlns="4873beb7-5857-4685-be1f-d57550cc96cc">Complete</EditorialStatus>
+    <LastModifiedDateTime xmlns="4873beb7-5857-4685-be1f-d57550cc96cc" xsi:nil="true"/>
+    <ScenarioTagsTaxHTField0 xmlns="4873beb7-5857-4685-be1f-d57550cc96cc">
+      <Terms xmlns="http://schemas.microsoft.com/office/infopath/2007/PartnerControls"/>
+    </ScenarioTagsTaxHTField0>
+    <LocProcessedForMarketsLookup xmlns="4873beb7-5857-4685-be1f-d57550cc96cc" xsi:nil="true"/>
+    <TPLaunchHelpLinkType xmlns="4873beb7-5857-4685-be1f-d57550cc96cc">Template</TPLaunchHelpLinkType>
+    <OriginalRelease xmlns="4873beb7-5857-4685-be1f-d57550cc96cc">15</OriginalRelease>
+    <LocalizationTagsTaxHTField0 xmlns="4873beb7-5857-4685-be1f-d57550cc96cc">
+      <Terms xmlns="http://schemas.microsoft.com/office/infopath/2007/PartnerControls"/>
+    </LocalizationTagsTaxHTField0>
+    <UACurrentWords xmlns="4873beb7-5857-4685-be1f-d57550cc96cc" xsi:nil="true"/>
+    <ArtSampleDocs xmlns="4873beb7-5857-4685-be1f-d57550cc96cc" xsi:nil="true"/>
+    <UALocRecommendation xmlns="4873beb7-5857-4685-be1f-d57550cc96cc">Localize</UALocRecommendation>
+    <Manager xmlns="4873beb7-5857-4685-be1f-d57550cc96cc" xsi:nil="true"/>
+    <LocOverallHandbackStatusLookup xmlns="4873beb7-5857-4685-be1f-d57550cc96cc" xsi:nil="true"/>
+    <ShowIn xmlns="4873beb7-5857-4685-be1f-d57550cc96cc">Show everywhere</ShowIn>
+    <UANotes xmlns="4873beb7-5857-4685-be1f-d57550cc96cc" xsi:nil="true"/>
+    <InternalTagsTaxHTField0 xmlns="4873beb7-5857-4685-be1f-d57550cc96cc">
+      <Terms xmlns="http://schemas.microsoft.com/office/infopath/2007/PartnerControls"/>
+    </InternalTagsTaxHTField0>
+    <CSXHash xmlns="4873beb7-5857-4685-be1f-d57550cc96cc" xsi:nil="true"/>
+    <VoteCount xmlns="4873beb7-5857-4685-be1f-d57550cc96cc" xsi:nil="true"/>
+    <AssetExpire xmlns="4873beb7-5857-4685-be1f-d57550cc96cc">2029-05-12T07:00:00+00:00</AssetExpire>
+    <DSATActionTaken xmlns="4873beb7-5857-4685-be1f-d57550cc96cc" xsi:nil="true"/>
+    <CSXSubmissionMarket xmlns="4873beb7-5857-4685-be1f-d57550cc96cc" xsi:nil="true"/>
+    <LocMarketGroupTiers2 xmlns="4873beb7-5857-4685-be1f-d57550cc96cc" xsi:nil="true"/>
+  </documentManagement>
+</p:properties>
+</file>
+
 <file path=customXml/item3.xml><?xml version="1.0" encoding="utf-8"?>
 <?mso-contentType ?>
 <FormTemplates xmlns="http://schemas.microsoft.com/sharepoint/v3/contenttype/forms">
@@ -18485,22 +18449,6 @@
 </file>
 
 <file path=customXml/itemProps1.xml><?xml version="1.0" encoding="utf-8"?>
-<ds:datastoreItem xmlns:ds="http://schemas.openxmlformats.org/officeDocument/2006/customXml" ds:itemID="{60C67BEE-D13F-4BD2-98A5-34D8A0977F68}">
-  <ds:schemaRefs>
-    <ds:schemaRef ds:uri="4873beb7-5857-4685-be1f-d57550cc96cc"/>
-    <ds:schemaRef ds:uri="http://schemas.openxmlformats.org/package/2006/metadata/core-properties"/>
-    <ds:schemaRef ds:uri="http://purl.org/dc/terms/"/>
-    <ds:schemaRef ds:uri="http://schemas.microsoft.com/office/2006/documentManagement/types"/>
-    <ds:schemaRef ds:uri="http://purl.org/dc/elements/1.1/"/>
-    <ds:schemaRef ds:uri="http://schemas.microsoft.com/office/2006/metadata/properties"/>
-    <ds:schemaRef ds:uri="http://schemas.microsoft.com/office/infopath/2007/PartnerControls"/>
-    <ds:schemaRef ds:uri="http://www.w3.org/XML/1998/namespace"/>
-    <ds:schemaRef ds:uri="http://purl.org/dc/dcmitype/"/>
-  </ds:schemaRefs>
-</ds:datastoreItem>
-</file>
-
-<file path=customXml/itemProps2.xml><?xml version="1.0" encoding="utf-8"?>
 <ds:datastoreItem xmlns:ds="http://schemas.openxmlformats.org/officeDocument/2006/customXml" ds:itemID="{A09BF4D4-EF60-4196-BFC3-9462D607978C}">
   <ds:schemaRefs>
     <ds:schemaRef ds:uri="http://schemas.microsoft.com/office/2006/metadata/contentType"/>
@@ -18518,6 +18466,22 @@
 </ds:datastoreItem>
 </file>
 
+<file path=customXml/itemProps2.xml><?xml version="1.0" encoding="utf-8"?>
+<ds:datastoreItem xmlns:ds="http://schemas.openxmlformats.org/officeDocument/2006/customXml" ds:itemID="{60C67BEE-D13F-4BD2-98A5-34D8A0977F68}">
+  <ds:schemaRefs>
+    <ds:schemaRef ds:uri="4873beb7-5857-4685-be1f-d57550cc96cc"/>
+    <ds:schemaRef ds:uri="http://schemas.openxmlformats.org/package/2006/metadata/core-properties"/>
+    <ds:schemaRef ds:uri="http://purl.org/dc/terms/"/>
+    <ds:schemaRef ds:uri="http://schemas.microsoft.com/office/2006/documentManagement/types"/>
+    <ds:schemaRef ds:uri="http://purl.org/dc/elements/1.1/"/>
+    <ds:schemaRef ds:uri="http://schemas.microsoft.com/office/2006/metadata/properties"/>
+    <ds:schemaRef ds:uri="http://schemas.microsoft.com/office/infopath/2007/PartnerControls"/>
+    <ds:schemaRef ds:uri="http://www.w3.org/XML/1998/namespace"/>
+    <ds:schemaRef ds:uri="http://purl.org/dc/dcmitype/"/>
+  </ds:schemaRefs>
+</ds:datastoreItem>
+</file>
+
 <file path=customXml/itemProps3.xml><?xml version="1.0" encoding="utf-8"?>
 <ds:datastoreItem xmlns:ds="http://schemas.openxmlformats.org/officeDocument/2006/customXml" ds:itemID="{3836F65B-1B07-41EE-A0E8-BC6EF3855225}">
   <ds:schemaRefs>

</xml_diff>